<commit_message>
made further revisions based on reviewer comments
</commit_message>
<xml_diff>
--- a/analysis/figures/ModelSchematic.pptx
+++ b/analysis/figures/ModelSchematic.pptx
@@ -5,12 +5,10 @@
     <p:sldMasterId id="2147483661" r:id="rId1"/>
   </p:sldMasterIdLst>
   <p:notesMasterIdLst>
-    <p:notesMasterId r:id="rId5"/>
+    <p:notesMasterId r:id="rId3"/>
   </p:notesMasterIdLst>
   <p:sldIdLst>
-    <p:sldId id="261" r:id="rId2"/>
-    <p:sldId id="262" r:id="rId3"/>
-    <p:sldId id="263" r:id="rId4"/>
+    <p:sldId id="263" r:id="rId2"/>
   </p:sldIdLst>
   <p:sldSz cx="9144000" cy="6858000" type="screen4x3"/>
   <p:notesSz cx="6858000" cy="9144000"/>
@@ -109,6 +107,11 @@
       </a:defRPr>
     </a:lvl9pPr>
   </p:defaultTextStyle>
+  <p:extLst>
+    <p:ext uri="{EFAFB233-063F-42B5-8137-9DF3F51BA10A}">
+      <p15:sldGuideLst xmlns:p15="http://schemas.microsoft.com/office/powerpoint/2012/main"/>
+    </p:ext>
+  </p:extLst>
 </p:presentation>
 </file>
 
@@ -194,7 +197,7 @@
           <a:p>
             <a:fld id="{49AA702A-76F1-7246-AD0C-BCA0476387BB}" type="datetimeFigureOut">
               <a:rPr lang="en-US" smtClean="0"/>
-              <a:t>3/12/21</a:t>
+              <a:t>3/18/21</a:t>
             </a:fld>
             <a:endParaRPr lang="en-US"/>
           </a:p>
@@ -578,260 +581,6 @@
     </p:spTree>
     <p:extLst>
       <p:ext uri="{BB962C8B-B14F-4D97-AF65-F5344CB8AC3E}">
-        <p14:creationId xmlns:p14="http://schemas.microsoft.com/office/powerpoint/2010/main" val="1932049150"/>
-      </p:ext>
-    </p:extLst>
-  </p:cSld>
-  <p:clrMapOvr>
-    <a:masterClrMapping/>
-  </p:clrMapOvr>
-</p:notes>
-</file>
-
-<file path=ppt/notesSlides/notesSlide2.xml><?xml version="1.0" encoding="utf-8"?>
-<p:notes xmlns:a="http://schemas.openxmlformats.org/drawingml/2006/main" xmlns:r="http://schemas.openxmlformats.org/officeDocument/2006/relationships" xmlns:p="http://schemas.openxmlformats.org/presentationml/2006/main">
-  <p:cSld>
-    <p:spTree>
-      <p:nvGrpSpPr>
-        <p:cNvPr id="1" name=""/>
-        <p:cNvGrpSpPr/>
-        <p:nvPr/>
-      </p:nvGrpSpPr>
-      <p:grpSpPr>
-        <a:xfrm>
-          <a:off x="0" y="0"/>
-          <a:ext cx="0" cy="0"/>
-          <a:chOff x="0" y="0"/>
-          <a:chExt cx="0" cy="0"/>
-        </a:xfrm>
-      </p:grpSpPr>
-      <p:sp>
-        <p:nvSpPr>
-          <p:cNvPr id="2" name="Slide Image Placeholder 1"/>
-          <p:cNvSpPr>
-            <a:spLocks noGrp="1" noRot="1" noChangeAspect="1"/>
-          </p:cNvSpPr>
-          <p:nvPr>
-            <p:ph type="sldImg"/>
-          </p:nvPr>
-        </p:nvSpPr>
-        <p:spPr>
-          <a:xfrm>
-            <a:off x="1371600" y="1143000"/>
-            <a:ext cx="4114800" cy="3086100"/>
-          </a:xfrm>
-        </p:spPr>
-      </p:sp>
-      <p:sp>
-        <p:nvSpPr>
-          <p:cNvPr id="3" name="Notes Placeholder 2"/>
-          <p:cNvSpPr>
-            <a:spLocks noGrp="1"/>
-          </p:cNvSpPr>
-          <p:nvPr>
-            <p:ph type="body" idx="1"/>
-          </p:nvPr>
-        </p:nvSpPr>
-        <p:spPr/>
-        <p:txBody>
-          <a:bodyPr/>
-          <a:lstStyle/>
-          <a:p>
-            <a:endParaRPr lang="en-US"/>
-          </a:p>
-        </p:txBody>
-      </p:sp>
-      <p:sp>
-        <p:nvSpPr>
-          <p:cNvPr id="4" name="Header Placeholder 3"/>
-          <p:cNvSpPr>
-            <a:spLocks noGrp="1"/>
-          </p:cNvSpPr>
-          <p:nvPr>
-            <p:ph type="hdr" sz="quarter"/>
-          </p:nvPr>
-        </p:nvSpPr>
-        <p:spPr/>
-        <p:txBody>
-          <a:bodyPr/>
-          <a:lstStyle/>
-          <a:p>
-            <a:endParaRPr lang="en-US"/>
-          </a:p>
-        </p:txBody>
-      </p:sp>
-      <p:sp>
-        <p:nvSpPr>
-          <p:cNvPr id="5" name="Footer Placeholder 4"/>
-          <p:cNvSpPr>
-            <a:spLocks noGrp="1"/>
-          </p:cNvSpPr>
-          <p:nvPr>
-            <p:ph type="ftr" sz="quarter" idx="4"/>
-          </p:nvPr>
-        </p:nvSpPr>
-        <p:spPr/>
-        <p:txBody>
-          <a:bodyPr/>
-          <a:lstStyle/>
-          <a:p>
-            <a:endParaRPr lang="en-US"/>
-          </a:p>
-        </p:txBody>
-      </p:sp>
-      <p:sp>
-        <p:nvSpPr>
-          <p:cNvPr id="6" name="Slide Number Placeholder 5"/>
-          <p:cNvSpPr>
-            <a:spLocks noGrp="1"/>
-          </p:cNvSpPr>
-          <p:nvPr>
-            <p:ph type="sldNum" sz="quarter" idx="5"/>
-          </p:nvPr>
-        </p:nvSpPr>
-        <p:spPr/>
-        <p:txBody>
-          <a:bodyPr/>
-          <a:lstStyle/>
-          <a:p>
-            <a:fld id="{4455E8BA-6543-4F65-896E-182EE1444106}" type="slidenum">
-              <a:rPr lang="en-US" smtClean="0"/>
-              <a:t>2</a:t>
-            </a:fld>
-            <a:endParaRPr lang="en-US"/>
-          </a:p>
-        </p:txBody>
-      </p:sp>
-    </p:spTree>
-    <p:extLst>
-      <p:ext uri="{BB962C8B-B14F-4D97-AF65-F5344CB8AC3E}">
-        <p14:creationId xmlns:p14="http://schemas.microsoft.com/office/powerpoint/2010/main" val="3464339155"/>
-      </p:ext>
-    </p:extLst>
-  </p:cSld>
-  <p:clrMapOvr>
-    <a:masterClrMapping/>
-  </p:clrMapOvr>
-</p:notes>
-</file>
-
-<file path=ppt/notesSlides/notesSlide3.xml><?xml version="1.0" encoding="utf-8"?>
-<p:notes xmlns:a="http://schemas.openxmlformats.org/drawingml/2006/main" xmlns:r="http://schemas.openxmlformats.org/officeDocument/2006/relationships" xmlns:p="http://schemas.openxmlformats.org/presentationml/2006/main">
-  <p:cSld>
-    <p:spTree>
-      <p:nvGrpSpPr>
-        <p:cNvPr id="1" name=""/>
-        <p:cNvGrpSpPr/>
-        <p:nvPr/>
-      </p:nvGrpSpPr>
-      <p:grpSpPr>
-        <a:xfrm>
-          <a:off x="0" y="0"/>
-          <a:ext cx="0" cy="0"/>
-          <a:chOff x="0" y="0"/>
-          <a:chExt cx="0" cy="0"/>
-        </a:xfrm>
-      </p:grpSpPr>
-      <p:sp>
-        <p:nvSpPr>
-          <p:cNvPr id="2" name="Slide Image Placeholder 1"/>
-          <p:cNvSpPr>
-            <a:spLocks noGrp="1" noRot="1" noChangeAspect="1"/>
-          </p:cNvSpPr>
-          <p:nvPr>
-            <p:ph type="sldImg"/>
-          </p:nvPr>
-        </p:nvSpPr>
-        <p:spPr>
-          <a:xfrm>
-            <a:off x="1371600" y="1143000"/>
-            <a:ext cx="4114800" cy="3086100"/>
-          </a:xfrm>
-        </p:spPr>
-      </p:sp>
-      <p:sp>
-        <p:nvSpPr>
-          <p:cNvPr id="3" name="Notes Placeholder 2"/>
-          <p:cNvSpPr>
-            <a:spLocks noGrp="1"/>
-          </p:cNvSpPr>
-          <p:nvPr>
-            <p:ph type="body" idx="1"/>
-          </p:nvPr>
-        </p:nvSpPr>
-        <p:spPr/>
-        <p:txBody>
-          <a:bodyPr/>
-          <a:lstStyle/>
-          <a:p>
-            <a:endParaRPr lang="en-US"/>
-          </a:p>
-        </p:txBody>
-      </p:sp>
-      <p:sp>
-        <p:nvSpPr>
-          <p:cNvPr id="4" name="Header Placeholder 3"/>
-          <p:cNvSpPr>
-            <a:spLocks noGrp="1"/>
-          </p:cNvSpPr>
-          <p:nvPr>
-            <p:ph type="hdr" sz="quarter"/>
-          </p:nvPr>
-        </p:nvSpPr>
-        <p:spPr/>
-        <p:txBody>
-          <a:bodyPr/>
-          <a:lstStyle/>
-          <a:p>
-            <a:endParaRPr lang="en-US"/>
-          </a:p>
-        </p:txBody>
-      </p:sp>
-      <p:sp>
-        <p:nvSpPr>
-          <p:cNvPr id="5" name="Footer Placeholder 4"/>
-          <p:cNvSpPr>
-            <a:spLocks noGrp="1"/>
-          </p:cNvSpPr>
-          <p:nvPr>
-            <p:ph type="ftr" sz="quarter" idx="4"/>
-          </p:nvPr>
-        </p:nvSpPr>
-        <p:spPr/>
-        <p:txBody>
-          <a:bodyPr/>
-          <a:lstStyle/>
-          <a:p>
-            <a:endParaRPr lang="en-US"/>
-          </a:p>
-        </p:txBody>
-      </p:sp>
-      <p:sp>
-        <p:nvSpPr>
-          <p:cNvPr id="6" name="Slide Number Placeholder 5"/>
-          <p:cNvSpPr>
-            <a:spLocks noGrp="1"/>
-          </p:cNvSpPr>
-          <p:nvPr>
-            <p:ph type="sldNum" sz="quarter" idx="5"/>
-          </p:nvPr>
-        </p:nvSpPr>
-        <p:spPr/>
-        <p:txBody>
-          <a:bodyPr/>
-          <a:lstStyle/>
-          <a:p>
-            <a:fld id="{4455E8BA-6543-4F65-896E-182EE1444106}" type="slidenum">
-              <a:rPr lang="en-US" smtClean="0"/>
-              <a:t>3</a:t>
-            </a:fld>
-            <a:endParaRPr lang="en-US"/>
-          </a:p>
-        </p:txBody>
-      </p:sp>
-    </p:spTree>
-    <p:extLst>
-      <p:ext uri="{BB962C8B-B14F-4D97-AF65-F5344CB8AC3E}">
         <p14:creationId xmlns:p14="http://schemas.microsoft.com/office/powerpoint/2010/main" val="1609179208"/>
       </p:ext>
     </p:extLst>
@@ -973,7 +722,7 @@
           <a:p>
             <a:fld id="{6BCACFBF-2469-D94B-AF37-64E3DB50FAF4}" type="datetimeFigureOut">
               <a:rPr lang="en-US" smtClean="0"/>
-              <a:t>3/12/21</a:t>
+              <a:t>3/18/21</a:t>
             </a:fld>
             <a:endParaRPr lang="en-US"/>
           </a:p>
@@ -1143,7 +892,7 @@
           <a:p>
             <a:fld id="{6BCACFBF-2469-D94B-AF37-64E3DB50FAF4}" type="datetimeFigureOut">
               <a:rPr lang="en-US" smtClean="0"/>
-              <a:t>3/12/21</a:t>
+              <a:t>3/18/21</a:t>
             </a:fld>
             <a:endParaRPr lang="en-US"/>
           </a:p>
@@ -1323,7 +1072,7 @@
           <a:p>
             <a:fld id="{6BCACFBF-2469-D94B-AF37-64E3DB50FAF4}" type="datetimeFigureOut">
               <a:rPr lang="en-US" smtClean="0"/>
-              <a:t>3/12/21</a:t>
+              <a:t>3/18/21</a:t>
             </a:fld>
             <a:endParaRPr lang="en-US"/>
           </a:p>
@@ -1824,7 +1573,7 @@
           <a:p>
             <a:fld id="{6BCACFBF-2469-D94B-AF37-64E3DB50FAF4}" type="datetimeFigureOut">
               <a:rPr lang="en-US" smtClean="0"/>
-              <a:t>3/12/21</a:t>
+              <a:t>3/18/21</a:t>
             </a:fld>
             <a:endParaRPr lang="en-US"/>
           </a:p>
@@ -2068,7 +1817,7 @@
           <a:p>
             <a:fld id="{6BCACFBF-2469-D94B-AF37-64E3DB50FAF4}" type="datetimeFigureOut">
               <a:rPr lang="en-US" smtClean="0"/>
-              <a:t>3/12/21</a:t>
+              <a:t>3/18/21</a:t>
             </a:fld>
             <a:endParaRPr lang="en-US"/>
           </a:p>
@@ -2300,7 +2049,7 @@
           <a:p>
             <a:fld id="{6BCACFBF-2469-D94B-AF37-64E3DB50FAF4}" type="datetimeFigureOut">
               <a:rPr lang="en-US" smtClean="0"/>
-              <a:t>3/12/21</a:t>
+              <a:t>3/18/21</a:t>
             </a:fld>
             <a:endParaRPr lang="en-US"/>
           </a:p>
@@ -2667,7 +2416,7 @@
           <a:p>
             <a:fld id="{6BCACFBF-2469-D94B-AF37-64E3DB50FAF4}" type="datetimeFigureOut">
               <a:rPr lang="en-US" smtClean="0"/>
-              <a:t>3/12/21</a:t>
+              <a:t>3/18/21</a:t>
             </a:fld>
             <a:endParaRPr lang="en-US"/>
           </a:p>
@@ -2785,7 +2534,7 @@
           <a:p>
             <a:fld id="{6BCACFBF-2469-D94B-AF37-64E3DB50FAF4}" type="datetimeFigureOut">
               <a:rPr lang="en-US" smtClean="0"/>
-              <a:t>3/12/21</a:t>
+              <a:t>3/18/21</a:t>
             </a:fld>
             <a:endParaRPr lang="en-US"/>
           </a:p>
@@ -2880,7 +2629,7 @@
           <a:p>
             <a:fld id="{6BCACFBF-2469-D94B-AF37-64E3DB50FAF4}" type="datetimeFigureOut">
               <a:rPr lang="en-US" smtClean="0"/>
-              <a:t>3/12/21</a:t>
+              <a:t>3/18/21</a:t>
             </a:fld>
             <a:endParaRPr lang="en-US"/>
           </a:p>
@@ -3157,7 +2906,7 @@
           <a:p>
             <a:fld id="{6BCACFBF-2469-D94B-AF37-64E3DB50FAF4}" type="datetimeFigureOut">
               <a:rPr lang="en-US" smtClean="0"/>
-              <a:t>3/12/21</a:t>
+              <a:t>3/18/21</a:t>
             </a:fld>
             <a:endParaRPr lang="en-US"/>
           </a:p>
@@ -3414,7 +3163,7 @@
           <a:p>
             <a:fld id="{6BCACFBF-2469-D94B-AF37-64E3DB50FAF4}" type="datetimeFigureOut">
               <a:rPr lang="en-US" smtClean="0"/>
-              <a:t>3/12/21</a:t>
+              <a:t>3/18/21</a:t>
             </a:fld>
             <a:endParaRPr lang="en-US"/>
           </a:p>
@@ -3627,7 +3376,7 @@
           <a:p>
             <a:fld id="{6BCACFBF-2469-D94B-AF37-64E3DB50FAF4}" type="datetimeFigureOut">
               <a:rPr lang="en-US" smtClean="0"/>
-              <a:t>3/12/21</a:t>
+              <a:t>3/18/21</a:t>
             </a:fld>
             <a:endParaRPr lang="en-US"/>
           </a:p>
@@ -4033,3569 +3782,8 @@
           <a:chExt cx="0" cy="0"/>
         </a:xfrm>
       </p:grpSpPr>
-      <p:sp>
-        <p:nvSpPr>
-          <p:cNvPr id="7" name="Rounded Rectangle 6">
-            <a:extLst>
-              <a:ext uri="{FF2B5EF4-FFF2-40B4-BE49-F238E27FC236}">
-                <a16:creationId xmlns:a16="http://schemas.microsoft.com/office/drawing/2014/main" id="{7DC20666-1DE7-324E-ACDD-412112E1E1CB}"/>
-              </a:ext>
-            </a:extLst>
-          </p:cNvPr>
-          <p:cNvSpPr/>
-          <p:nvPr/>
-        </p:nvSpPr>
-        <p:spPr>
-          <a:xfrm>
-            <a:off x="5925745" y="358552"/>
-            <a:ext cx="964905" cy="805416"/>
-          </a:xfrm>
-          <a:prstGeom prst="roundRect">
-            <a:avLst/>
-          </a:prstGeom>
-        </p:spPr>
-        <p:style>
-          <a:lnRef idx="2">
-            <a:schemeClr val="dk1"/>
-          </a:lnRef>
-          <a:fillRef idx="1">
-            <a:schemeClr val="lt1"/>
-          </a:fillRef>
-          <a:effectRef idx="0">
-            <a:schemeClr val="dk1"/>
-          </a:effectRef>
-          <a:fontRef idx="minor">
-            <a:schemeClr val="dk1"/>
-          </a:fontRef>
-        </p:style>
-        <p:txBody>
-          <a:bodyPr rtlCol="0" anchor="ctr"/>
-          <a:lstStyle/>
-          <a:p>
-            <a:pPr algn="ctr"/>
-            <a:r>
-              <a:rPr lang="en-US" sz="1350" dirty="0"/>
-              <a:t>Window Counts</a:t>
-            </a:r>
-          </a:p>
-        </p:txBody>
-      </p:sp>
-      <p:sp>
-        <p:nvSpPr>
-          <p:cNvPr id="8" name="Rounded Rectangle 7">
-            <a:extLst>
-              <a:ext uri="{FF2B5EF4-FFF2-40B4-BE49-F238E27FC236}">
-                <a16:creationId xmlns:a16="http://schemas.microsoft.com/office/drawing/2014/main" id="{131BC15C-59EF-B547-888E-70723CE44B51}"/>
-              </a:ext>
-            </a:extLst>
-          </p:cNvPr>
-          <p:cNvSpPr/>
-          <p:nvPr/>
-        </p:nvSpPr>
-        <p:spPr>
-          <a:xfrm>
-            <a:off x="3184947" y="358553"/>
-            <a:ext cx="964905" cy="805416"/>
-          </a:xfrm>
-          <a:prstGeom prst="roundRect">
-            <a:avLst/>
-          </a:prstGeom>
-        </p:spPr>
-        <p:style>
-          <a:lnRef idx="2">
-            <a:schemeClr val="dk1"/>
-          </a:lnRef>
-          <a:fillRef idx="1">
-            <a:schemeClr val="lt1"/>
-          </a:fillRef>
-          <a:effectRef idx="0">
-            <a:schemeClr val="dk1"/>
-          </a:effectRef>
-          <a:fontRef idx="minor">
-            <a:schemeClr val="dk1"/>
-          </a:fontRef>
-        </p:style>
-        <p:txBody>
-          <a:bodyPr rtlCol="0" anchor="ctr"/>
-          <a:lstStyle/>
-          <a:p>
-            <a:pPr algn="ctr"/>
-            <a:r>
-              <a:rPr lang="en-US" sz="1350" dirty="0"/>
-              <a:t>PIT Tags</a:t>
-            </a:r>
-          </a:p>
-        </p:txBody>
-      </p:sp>
-      <p:sp>
-        <p:nvSpPr>
-          <p:cNvPr id="9" name="Rounded Rectangle 8">
-            <a:extLst>
-              <a:ext uri="{FF2B5EF4-FFF2-40B4-BE49-F238E27FC236}">
-                <a16:creationId xmlns:a16="http://schemas.microsoft.com/office/drawing/2014/main" id="{E054EA09-CD09-804A-9C7C-177B564F4D4A}"/>
-              </a:ext>
-            </a:extLst>
-          </p:cNvPr>
-          <p:cNvSpPr/>
-          <p:nvPr/>
-        </p:nvSpPr>
-        <p:spPr>
-          <a:xfrm>
-            <a:off x="474489" y="358552"/>
-            <a:ext cx="964905" cy="805416"/>
-          </a:xfrm>
-          <a:prstGeom prst="roundRect">
-            <a:avLst/>
-          </a:prstGeom>
-        </p:spPr>
-        <p:style>
-          <a:lnRef idx="2">
-            <a:schemeClr val="dk1"/>
-          </a:lnRef>
-          <a:fillRef idx="1">
-            <a:schemeClr val="lt1"/>
-          </a:fillRef>
-          <a:effectRef idx="0">
-            <a:schemeClr val="dk1"/>
-          </a:effectRef>
-          <a:fontRef idx="minor">
-            <a:schemeClr val="dk1"/>
-          </a:fontRef>
-        </p:style>
-        <p:txBody>
-          <a:bodyPr rtlCol="0" anchor="ctr"/>
-          <a:lstStyle/>
-          <a:p>
-            <a:pPr algn="ctr"/>
-            <a:r>
-              <a:rPr lang="en-US" sz="1350" dirty="0"/>
-              <a:t>Fish Trap</a:t>
-            </a:r>
-          </a:p>
-        </p:txBody>
-      </p:sp>
-      <p:sp>
-        <p:nvSpPr>
-          <p:cNvPr id="10" name="Rounded Rectangle 9">
-            <a:extLst>
-              <a:ext uri="{FF2B5EF4-FFF2-40B4-BE49-F238E27FC236}">
-                <a16:creationId xmlns:a16="http://schemas.microsoft.com/office/drawing/2014/main" id="{70F6C5E0-D8FE-B54B-B2CB-18CDEAEBC054}"/>
-              </a:ext>
-            </a:extLst>
-          </p:cNvPr>
-          <p:cNvSpPr/>
-          <p:nvPr/>
-        </p:nvSpPr>
-        <p:spPr>
-          <a:xfrm>
-            <a:off x="4658505" y="1608412"/>
-            <a:ext cx="964905" cy="805416"/>
-          </a:xfrm>
-          <a:prstGeom prst="roundRect">
-            <a:avLst/>
-          </a:prstGeom>
-        </p:spPr>
-        <p:style>
-          <a:lnRef idx="2">
-            <a:schemeClr val="dk1">
-              <a:shade val="50000"/>
-            </a:schemeClr>
-          </a:lnRef>
-          <a:fillRef idx="1">
-            <a:schemeClr val="dk1"/>
-          </a:fillRef>
-          <a:effectRef idx="0">
-            <a:schemeClr val="dk1"/>
-          </a:effectRef>
-          <a:fontRef idx="minor">
-            <a:schemeClr val="lt1"/>
-          </a:fontRef>
-        </p:style>
-        <p:txBody>
-          <a:bodyPr rtlCol="0" anchor="ctr"/>
-          <a:lstStyle/>
-          <a:p>
-            <a:pPr algn="ctr"/>
-            <a:r>
-              <a:rPr lang="en-US" sz="1350" dirty="0"/>
-              <a:t>Night Passage Rate</a:t>
-            </a:r>
-          </a:p>
-        </p:txBody>
-      </p:sp>
-      <p:sp>
-        <p:nvSpPr>
-          <p:cNvPr id="11" name="Rounded Rectangle 10">
-            <a:extLst>
-              <a:ext uri="{FF2B5EF4-FFF2-40B4-BE49-F238E27FC236}">
-                <a16:creationId xmlns:a16="http://schemas.microsoft.com/office/drawing/2014/main" id="{FBA68ED4-9DE9-AF4A-8ED7-0163BC0042DE}"/>
-              </a:ext>
-            </a:extLst>
-          </p:cNvPr>
-          <p:cNvSpPr/>
-          <p:nvPr/>
-        </p:nvSpPr>
-        <p:spPr>
-          <a:xfrm>
-            <a:off x="1749452" y="1608412"/>
-            <a:ext cx="964905" cy="805416"/>
-          </a:xfrm>
-          <a:prstGeom prst="roundRect">
-            <a:avLst/>
-          </a:prstGeom>
-        </p:spPr>
-        <p:style>
-          <a:lnRef idx="2">
-            <a:schemeClr val="dk1">
-              <a:shade val="50000"/>
-            </a:schemeClr>
-          </a:lnRef>
-          <a:fillRef idx="1">
-            <a:schemeClr val="dk1"/>
-          </a:fillRef>
-          <a:effectRef idx="0">
-            <a:schemeClr val="dk1"/>
-          </a:effectRef>
-          <a:fontRef idx="minor">
-            <a:schemeClr val="lt1"/>
-          </a:fontRef>
-        </p:style>
-        <p:txBody>
-          <a:bodyPr rtlCol="0" anchor="ctr"/>
-          <a:lstStyle/>
-          <a:p>
-            <a:pPr algn="ctr"/>
-            <a:r>
-              <a:rPr lang="en-US" sz="1350" dirty="0"/>
-              <a:t>Trap Rate</a:t>
-            </a:r>
-          </a:p>
-        </p:txBody>
-      </p:sp>
-      <p:sp>
-        <p:nvSpPr>
-          <p:cNvPr id="12" name="Rounded Rectangle 11">
-            <a:extLst>
-              <a:ext uri="{FF2B5EF4-FFF2-40B4-BE49-F238E27FC236}">
-                <a16:creationId xmlns:a16="http://schemas.microsoft.com/office/drawing/2014/main" id="{B278A405-9186-9740-9EC9-1AB7CF626AB4}"/>
-              </a:ext>
-            </a:extLst>
-          </p:cNvPr>
-          <p:cNvSpPr/>
-          <p:nvPr/>
-        </p:nvSpPr>
-        <p:spPr>
-          <a:xfrm>
-            <a:off x="3086827" y="2758881"/>
-            <a:ext cx="1161144" cy="805416"/>
-          </a:xfrm>
-          <a:prstGeom prst="roundRect">
-            <a:avLst/>
-          </a:prstGeom>
-        </p:spPr>
-        <p:style>
-          <a:lnRef idx="1">
-            <a:schemeClr val="accent3"/>
-          </a:lnRef>
-          <a:fillRef idx="2">
-            <a:schemeClr val="accent3"/>
-          </a:fillRef>
-          <a:effectRef idx="1">
-            <a:schemeClr val="accent3"/>
-          </a:effectRef>
-          <a:fontRef idx="minor">
-            <a:schemeClr val="dk1"/>
-          </a:fontRef>
-        </p:style>
-        <p:txBody>
-          <a:bodyPr rtlCol="0" anchor="ctr"/>
-          <a:lstStyle/>
-          <a:p>
-            <a:pPr algn="ctr"/>
-            <a:r>
-              <a:rPr lang="en-US" sz="1350" dirty="0"/>
-              <a:t>Total Fish Crossing Dam</a:t>
-            </a:r>
-          </a:p>
-        </p:txBody>
-      </p:sp>
-      <p:sp>
-        <p:nvSpPr>
-          <p:cNvPr id="13" name="Rounded Rectangle 12">
-            <a:extLst>
-              <a:ext uri="{FF2B5EF4-FFF2-40B4-BE49-F238E27FC236}">
-                <a16:creationId xmlns:a16="http://schemas.microsoft.com/office/drawing/2014/main" id="{50BE2044-D52D-AB46-9595-D7101257EE2F}"/>
-              </a:ext>
-            </a:extLst>
-          </p:cNvPr>
-          <p:cNvSpPr/>
-          <p:nvPr/>
-        </p:nvSpPr>
-        <p:spPr>
-          <a:xfrm>
-            <a:off x="6133237" y="2639526"/>
-            <a:ext cx="1283332" cy="805416"/>
-          </a:xfrm>
-          <a:prstGeom prst="roundRect">
-            <a:avLst/>
-          </a:prstGeom>
-        </p:spPr>
-        <p:style>
-          <a:lnRef idx="2">
-            <a:schemeClr val="dk1">
-              <a:shade val="50000"/>
-            </a:schemeClr>
-          </a:lnRef>
-          <a:fillRef idx="1">
-            <a:schemeClr val="dk1"/>
-          </a:fillRef>
-          <a:effectRef idx="0">
-            <a:schemeClr val="dk1"/>
-          </a:effectRef>
-          <a:fontRef idx="minor">
-            <a:schemeClr val="lt1"/>
-          </a:fontRef>
-        </p:style>
-        <p:txBody>
-          <a:bodyPr rtlCol="0" anchor="ctr"/>
-          <a:lstStyle/>
-          <a:p>
-            <a:pPr algn="ctr"/>
-            <a:r>
-              <a:rPr lang="en-US" sz="1350" dirty="0"/>
-              <a:t>Re-ascension Rate</a:t>
-            </a:r>
-          </a:p>
-        </p:txBody>
-      </p:sp>
-      <p:sp>
-        <p:nvSpPr>
-          <p:cNvPr id="14" name="Rounded Rectangle 13">
-            <a:extLst>
-              <a:ext uri="{FF2B5EF4-FFF2-40B4-BE49-F238E27FC236}">
-                <a16:creationId xmlns:a16="http://schemas.microsoft.com/office/drawing/2014/main" id="{394E90F3-4253-3F40-80BF-6E7119F0E48A}"/>
-              </a:ext>
-            </a:extLst>
-          </p:cNvPr>
-          <p:cNvSpPr/>
-          <p:nvPr/>
-        </p:nvSpPr>
-        <p:spPr>
-          <a:xfrm>
-            <a:off x="390516" y="4041465"/>
-            <a:ext cx="1203907" cy="805416"/>
-          </a:xfrm>
-          <a:prstGeom prst="roundRect">
-            <a:avLst/>
-          </a:prstGeom>
-        </p:spPr>
-        <p:style>
-          <a:lnRef idx="2">
-            <a:schemeClr val="dk1">
-              <a:shade val="50000"/>
-            </a:schemeClr>
-          </a:lnRef>
-          <a:fillRef idx="1">
-            <a:schemeClr val="dk1"/>
-          </a:fillRef>
-          <a:effectRef idx="0">
-            <a:schemeClr val="dk1"/>
-          </a:effectRef>
-          <a:fontRef idx="minor">
-            <a:schemeClr val="lt1"/>
-          </a:fontRef>
-        </p:style>
-        <p:txBody>
-          <a:bodyPr rtlCol="0" anchor="ctr"/>
-          <a:lstStyle/>
-          <a:p>
-            <a:pPr algn="ctr"/>
-            <a:r>
-              <a:rPr lang="en-US" sz="1350" dirty="0"/>
-              <a:t>Origin Proportions</a:t>
-            </a:r>
-          </a:p>
-        </p:txBody>
-      </p:sp>
-      <p:sp>
-        <p:nvSpPr>
-          <p:cNvPr id="15" name="Rounded Rectangle 14">
-            <a:extLst>
-              <a:ext uri="{FF2B5EF4-FFF2-40B4-BE49-F238E27FC236}">
-                <a16:creationId xmlns:a16="http://schemas.microsoft.com/office/drawing/2014/main" id="{484AB6B6-EBA3-9649-8407-BEDE06BB3C00}"/>
-              </a:ext>
-            </a:extLst>
-          </p:cNvPr>
-          <p:cNvSpPr/>
-          <p:nvPr/>
-        </p:nvSpPr>
-        <p:spPr>
-          <a:xfrm>
-            <a:off x="4560385" y="4041465"/>
-            <a:ext cx="1161144" cy="805416"/>
-          </a:xfrm>
-          <a:prstGeom prst="roundRect">
-            <a:avLst/>
-          </a:prstGeom>
-        </p:spPr>
-        <p:style>
-          <a:lnRef idx="1">
-            <a:schemeClr val="accent3"/>
-          </a:lnRef>
-          <a:fillRef idx="2">
-            <a:schemeClr val="accent3"/>
-          </a:fillRef>
-          <a:effectRef idx="1">
-            <a:schemeClr val="accent3"/>
-          </a:effectRef>
-          <a:fontRef idx="minor">
-            <a:schemeClr val="dk1"/>
-          </a:fontRef>
-        </p:style>
-        <p:txBody>
-          <a:bodyPr rtlCol="0" anchor="ctr"/>
-          <a:lstStyle/>
-          <a:p>
-            <a:pPr algn="ctr"/>
-            <a:r>
-              <a:rPr lang="en-US" sz="1350" dirty="0"/>
-              <a:t>Unique Escapement</a:t>
-            </a:r>
-          </a:p>
-        </p:txBody>
-      </p:sp>
-      <p:sp>
-        <p:nvSpPr>
-          <p:cNvPr id="16" name="Rounded Rectangle 15">
-            <a:extLst>
-              <a:ext uri="{FF2B5EF4-FFF2-40B4-BE49-F238E27FC236}">
-                <a16:creationId xmlns:a16="http://schemas.microsoft.com/office/drawing/2014/main" id="{E00102CB-BD62-1C45-B707-F287112F8AB6}"/>
-              </a:ext>
-            </a:extLst>
-          </p:cNvPr>
-          <p:cNvSpPr/>
-          <p:nvPr/>
-        </p:nvSpPr>
-        <p:spPr>
-          <a:xfrm>
-            <a:off x="2127648" y="5208655"/>
-            <a:ext cx="1918357" cy="970752"/>
-          </a:xfrm>
-          <a:prstGeom prst="roundRect">
-            <a:avLst/>
-          </a:prstGeom>
-        </p:spPr>
-        <p:style>
-          <a:lnRef idx="1">
-            <a:schemeClr val="accent3"/>
-          </a:lnRef>
-          <a:fillRef idx="2">
-            <a:schemeClr val="accent3"/>
-          </a:fillRef>
-          <a:effectRef idx="1">
-            <a:schemeClr val="accent3"/>
-          </a:effectRef>
-          <a:fontRef idx="minor">
-            <a:schemeClr val="dk1"/>
-          </a:fontRef>
-        </p:style>
-        <p:txBody>
-          <a:bodyPr rtlCol="0" anchor="ctr"/>
-          <a:lstStyle/>
-          <a:p>
-            <a:pPr algn="ctr"/>
-            <a:r>
-              <a:rPr lang="en-US" sz="1350" dirty="0"/>
-              <a:t>Unique </a:t>
-            </a:r>
-          </a:p>
-          <a:p>
-            <a:pPr algn="ctr"/>
-            <a:r>
-              <a:rPr lang="en-US" sz="1350" dirty="0"/>
-              <a:t>Wild, Hatchery, HNC Escapement</a:t>
-            </a:r>
-          </a:p>
-        </p:txBody>
-      </p:sp>
-      <p:cxnSp>
-        <p:nvCxnSpPr>
-          <p:cNvPr id="81" name="Curved Connector 80">
-            <a:extLst>
-              <a:ext uri="{FF2B5EF4-FFF2-40B4-BE49-F238E27FC236}">
-                <a16:creationId xmlns:a16="http://schemas.microsoft.com/office/drawing/2014/main" id="{3AC3B483-B501-0646-87E7-5C26646CCAC7}"/>
-              </a:ext>
-            </a:extLst>
-          </p:cNvPr>
-          <p:cNvCxnSpPr>
-            <a:stCxn id="7" idx="2"/>
-            <a:endCxn id="12" idx="3"/>
-          </p:cNvCxnSpPr>
-          <p:nvPr/>
-        </p:nvCxnSpPr>
-        <p:spPr>
-          <a:xfrm rot="5400000">
-            <a:off x="4329275" y="1082665"/>
-            <a:ext cx="1997621" cy="2160227"/>
-          </a:xfrm>
-          <a:prstGeom prst="curvedConnector2">
-            <a:avLst/>
-          </a:prstGeom>
-          <a:ln w="12700">
-            <a:tailEnd type="triangle" w="lg" len="med"/>
-          </a:ln>
-        </p:spPr>
-        <p:style>
-          <a:lnRef idx="1">
-            <a:schemeClr val="dk1"/>
-          </a:lnRef>
-          <a:fillRef idx="0">
-            <a:schemeClr val="dk1"/>
-          </a:fillRef>
-          <a:effectRef idx="0">
-            <a:schemeClr val="dk1"/>
-          </a:effectRef>
-          <a:fontRef idx="minor">
-            <a:schemeClr val="tx1"/>
-          </a:fontRef>
-        </p:style>
-      </p:cxnSp>
-      <p:cxnSp>
-        <p:nvCxnSpPr>
-          <p:cNvPr id="82" name="Curved Connector 81">
-            <a:extLst>
-              <a:ext uri="{FF2B5EF4-FFF2-40B4-BE49-F238E27FC236}">
-                <a16:creationId xmlns:a16="http://schemas.microsoft.com/office/drawing/2014/main" id="{87AE347D-617E-C242-9B2C-CF4CB412361B}"/>
-              </a:ext>
-            </a:extLst>
-          </p:cNvPr>
-          <p:cNvCxnSpPr>
-            <a:cxnSpLocks/>
-            <a:stCxn id="10" idx="2"/>
-            <a:endCxn id="12" idx="3"/>
-          </p:cNvCxnSpPr>
-          <p:nvPr/>
-        </p:nvCxnSpPr>
-        <p:spPr>
-          <a:xfrm rot="5400000">
-            <a:off x="4320585" y="2341215"/>
-            <a:ext cx="747761" cy="892987"/>
-          </a:xfrm>
-          <a:prstGeom prst="curvedConnector2">
-            <a:avLst/>
-          </a:prstGeom>
-          <a:ln w="12700">
-            <a:tailEnd type="triangle" w="lg" len="med"/>
-          </a:ln>
-        </p:spPr>
-        <p:style>
-          <a:lnRef idx="1">
-            <a:schemeClr val="dk1"/>
-          </a:lnRef>
-          <a:fillRef idx="0">
-            <a:schemeClr val="dk1"/>
-          </a:fillRef>
-          <a:effectRef idx="0">
-            <a:schemeClr val="dk1"/>
-          </a:effectRef>
-          <a:fontRef idx="minor">
-            <a:schemeClr val="tx1"/>
-          </a:fontRef>
-        </p:style>
-      </p:cxnSp>
-      <p:cxnSp>
-        <p:nvCxnSpPr>
-          <p:cNvPr id="85" name="Curved Connector 84">
-            <a:extLst>
-              <a:ext uri="{FF2B5EF4-FFF2-40B4-BE49-F238E27FC236}">
-                <a16:creationId xmlns:a16="http://schemas.microsoft.com/office/drawing/2014/main" id="{5490071E-A4DB-554F-AB5B-A48A6D917188}"/>
-              </a:ext>
-            </a:extLst>
-          </p:cNvPr>
-          <p:cNvCxnSpPr>
-            <a:cxnSpLocks/>
-            <a:stCxn id="11" idx="2"/>
-            <a:endCxn id="12" idx="1"/>
-          </p:cNvCxnSpPr>
-          <p:nvPr/>
-        </p:nvCxnSpPr>
-        <p:spPr>
-          <a:xfrm rot="16200000" flipH="1">
-            <a:off x="2285486" y="2360247"/>
-            <a:ext cx="747761" cy="854922"/>
-          </a:xfrm>
-          <a:prstGeom prst="curvedConnector2">
-            <a:avLst/>
-          </a:prstGeom>
-          <a:ln w="12700">
-            <a:tailEnd type="triangle" w="lg" len="med"/>
-          </a:ln>
-        </p:spPr>
-        <p:style>
-          <a:lnRef idx="1">
-            <a:schemeClr val="dk1"/>
-          </a:lnRef>
-          <a:fillRef idx="0">
-            <a:schemeClr val="dk1"/>
-          </a:fillRef>
-          <a:effectRef idx="0">
-            <a:schemeClr val="dk1"/>
-          </a:effectRef>
-          <a:fontRef idx="minor">
-            <a:schemeClr val="tx1"/>
-          </a:fontRef>
-        </p:style>
-      </p:cxnSp>
-      <p:cxnSp>
-        <p:nvCxnSpPr>
-          <p:cNvPr id="88" name="Curved Connector 87">
-            <a:extLst>
-              <a:ext uri="{FF2B5EF4-FFF2-40B4-BE49-F238E27FC236}">
-                <a16:creationId xmlns:a16="http://schemas.microsoft.com/office/drawing/2014/main" id="{3D964BBC-978F-3445-A0F8-238B88BB3393}"/>
-              </a:ext>
-            </a:extLst>
-          </p:cNvPr>
-          <p:cNvCxnSpPr>
-            <a:cxnSpLocks/>
-            <a:stCxn id="9" idx="2"/>
-            <a:endCxn id="12" idx="1"/>
-          </p:cNvCxnSpPr>
-          <p:nvPr/>
-        </p:nvCxnSpPr>
-        <p:spPr>
-          <a:xfrm rot="16200000" flipH="1">
-            <a:off x="1023074" y="1097835"/>
-            <a:ext cx="1997621" cy="2129885"/>
-          </a:xfrm>
-          <a:prstGeom prst="curvedConnector2">
-            <a:avLst/>
-          </a:prstGeom>
-          <a:ln w="12700">
-            <a:tailEnd type="triangle" w="lg" len="med"/>
-          </a:ln>
-        </p:spPr>
-        <p:style>
-          <a:lnRef idx="1">
-            <a:schemeClr val="dk1"/>
-          </a:lnRef>
-          <a:fillRef idx="0">
-            <a:schemeClr val="dk1"/>
-          </a:fillRef>
-          <a:effectRef idx="0">
-            <a:schemeClr val="dk1"/>
-          </a:effectRef>
-          <a:fontRef idx="minor">
-            <a:schemeClr val="tx1"/>
-          </a:fontRef>
-        </p:style>
-      </p:cxnSp>
-      <p:cxnSp>
-        <p:nvCxnSpPr>
-          <p:cNvPr id="91" name="Straight Arrow Connector 90">
-            <a:extLst>
-              <a:ext uri="{FF2B5EF4-FFF2-40B4-BE49-F238E27FC236}">
-                <a16:creationId xmlns:a16="http://schemas.microsoft.com/office/drawing/2014/main" id="{31778B8A-ED9C-1144-9163-B1C6F3F11E62}"/>
-              </a:ext>
-            </a:extLst>
-          </p:cNvPr>
-          <p:cNvCxnSpPr>
-            <a:cxnSpLocks/>
-            <a:stCxn id="9" idx="2"/>
-            <a:endCxn id="14" idx="0"/>
-          </p:cNvCxnSpPr>
-          <p:nvPr/>
-        </p:nvCxnSpPr>
-        <p:spPr>
-          <a:xfrm>
-            <a:off x="956942" y="1163968"/>
-            <a:ext cx="35528" cy="2877497"/>
-          </a:xfrm>
-          <a:prstGeom prst="straightConnector1">
-            <a:avLst/>
-          </a:prstGeom>
-          <a:ln w="12700">
-            <a:tailEnd type="triangle" w="lg" len="med"/>
-          </a:ln>
-        </p:spPr>
-        <p:style>
-          <a:lnRef idx="1">
-            <a:schemeClr val="dk1"/>
-          </a:lnRef>
-          <a:fillRef idx="0">
-            <a:schemeClr val="dk1"/>
-          </a:fillRef>
-          <a:effectRef idx="0">
-            <a:schemeClr val="dk1"/>
-          </a:effectRef>
-          <a:fontRef idx="minor">
-            <a:schemeClr val="tx1"/>
-          </a:fontRef>
-        </p:style>
-      </p:cxnSp>
-      <p:cxnSp>
-        <p:nvCxnSpPr>
-          <p:cNvPr id="94" name="Curved Connector 93">
-            <a:extLst>
-              <a:ext uri="{FF2B5EF4-FFF2-40B4-BE49-F238E27FC236}">
-                <a16:creationId xmlns:a16="http://schemas.microsoft.com/office/drawing/2014/main" id="{EA9AF001-2E93-F945-A9C1-A42413C1E0C5}"/>
-              </a:ext>
-            </a:extLst>
-          </p:cNvPr>
-          <p:cNvCxnSpPr>
-            <a:cxnSpLocks/>
-            <a:stCxn id="8" idx="3"/>
-            <a:endCxn id="13" idx="0"/>
-          </p:cNvCxnSpPr>
-          <p:nvPr/>
-        </p:nvCxnSpPr>
-        <p:spPr>
-          <a:xfrm>
-            <a:off x="4149852" y="761261"/>
-            <a:ext cx="2625051" cy="1878265"/>
-          </a:xfrm>
-          <a:prstGeom prst="curvedConnector2">
-            <a:avLst/>
-          </a:prstGeom>
-          <a:ln w="12700">
-            <a:tailEnd type="triangle" w="lg" len="med"/>
-          </a:ln>
-        </p:spPr>
-        <p:style>
-          <a:lnRef idx="1">
-            <a:schemeClr val="dk1"/>
-          </a:lnRef>
-          <a:fillRef idx="0">
-            <a:schemeClr val="dk1"/>
-          </a:fillRef>
-          <a:effectRef idx="0">
-            <a:schemeClr val="dk1"/>
-          </a:effectRef>
-          <a:fontRef idx="minor">
-            <a:schemeClr val="tx1"/>
-          </a:fontRef>
-        </p:style>
-      </p:cxnSp>
-      <p:cxnSp>
-        <p:nvCxnSpPr>
-          <p:cNvPr id="97" name="Curved Connector 96">
-            <a:extLst>
-              <a:ext uri="{FF2B5EF4-FFF2-40B4-BE49-F238E27FC236}">
-                <a16:creationId xmlns:a16="http://schemas.microsoft.com/office/drawing/2014/main" id="{78438621-F564-094D-9D87-D78BF8BFBA15}"/>
-              </a:ext>
-            </a:extLst>
-          </p:cNvPr>
-          <p:cNvCxnSpPr>
-            <a:cxnSpLocks/>
-            <a:stCxn id="13" idx="1"/>
-            <a:endCxn id="15" idx="0"/>
-          </p:cNvCxnSpPr>
-          <p:nvPr/>
-        </p:nvCxnSpPr>
-        <p:spPr>
-          <a:xfrm rot="10800000" flipV="1">
-            <a:off x="5140957" y="3042233"/>
-            <a:ext cx="992280" cy="999231"/>
-          </a:xfrm>
-          <a:prstGeom prst="curvedConnector2">
-            <a:avLst/>
-          </a:prstGeom>
-          <a:ln w="12700">
-            <a:tailEnd type="triangle" w="lg" len="med"/>
-          </a:ln>
-        </p:spPr>
-        <p:style>
-          <a:lnRef idx="1">
-            <a:schemeClr val="dk1"/>
-          </a:lnRef>
-          <a:fillRef idx="0">
-            <a:schemeClr val="dk1"/>
-          </a:fillRef>
-          <a:effectRef idx="0">
-            <a:schemeClr val="dk1"/>
-          </a:effectRef>
-          <a:fontRef idx="minor">
-            <a:schemeClr val="tx1"/>
-          </a:fontRef>
-        </p:style>
-      </p:cxnSp>
-      <p:cxnSp>
-        <p:nvCxnSpPr>
-          <p:cNvPr id="100" name="Curved Connector 99">
-            <a:extLst>
-              <a:ext uri="{FF2B5EF4-FFF2-40B4-BE49-F238E27FC236}">
-                <a16:creationId xmlns:a16="http://schemas.microsoft.com/office/drawing/2014/main" id="{1EE7A001-E6C4-2E4B-B235-56548B57B558}"/>
-              </a:ext>
-            </a:extLst>
-          </p:cNvPr>
-          <p:cNvCxnSpPr>
-            <a:cxnSpLocks/>
-            <a:stCxn id="15" idx="1"/>
-            <a:endCxn id="16" idx="0"/>
-          </p:cNvCxnSpPr>
-          <p:nvPr/>
-        </p:nvCxnSpPr>
-        <p:spPr>
-          <a:xfrm rot="10800000" flipV="1">
-            <a:off x="3086827" y="4444173"/>
-            <a:ext cx="1473558" cy="764482"/>
-          </a:xfrm>
-          <a:prstGeom prst="curvedConnector2">
-            <a:avLst/>
-          </a:prstGeom>
-          <a:ln w="12700">
-            <a:tailEnd type="triangle" w="lg" len="med"/>
-          </a:ln>
-        </p:spPr>
-        <p:style>
-          <a:lnRef idx="1">
-            <a:schemeClr val="dk1"/>
-          </a:lnRef>
-          <a:fillRef idx="0">
-            <a:schemeClr val="dk1"/>
-          </a:fillRef>
-          <a:effectRef idx="0">
-            <a:schemeClr val="dk1"/>
-          </a:effectRef>
-          <a:fontRef idx="minor">
-            <a:schemeClr val="tx1"/>
-          </a:fontRef>
-        </p:style>
-      </p:cxnSp>
-      <p:cxnSp>
-        <p:nvCxnSpPr>
-          <p:cNvPr id="105" name="Curved Connector 104">
-            <a:extLst>
-              <a:ext uri="{FF2B5EF4-FFF2-40B4-BE49-F238E27FC236}">
-                <a16:creationId xmlns:a16="http://schemas.microsoft.com/office/drawing/2014/main" id="{A61C8F04-8EC4-E248-8EC8-9FFBB25010D2}"/>
-              </a:ext>
-            </a:extLst>
-          </p:cNvPr>
-          <p:cNvCxnSpPr>
-            <a:cxnSpLocks/>
-            <a:stCxn id="12" idx="2"/>
-            <a:endCxn id="15" idx="0"/>
-          </p:cNvCxnSpPr>
-          <p:nvPr/>
-        </p:nvCxnSpPr>
-        <p:spPr>
-          <a:xfrm rot="16200000" flipH="1">
-            <a:off x="4165594" y="3066102"/>
-            <a:ext cx="477168" cy="1473558"/>
-          </a:xfrm>
-          <a:prstGeom prst="curvedConnector3">
-            <a:avLst>
-              <a:gd name="adj1" fmla="val 50000"/>
-            </a:avLst>
-          </a:prstGeom>
-          <a:ln w="12700">
-            <a:tailEnd type="triangle" w="lg" len="med"/>
-          </a:ln>
-        </p:spPr>
-        <p:style>
-          <a:lnRef idx="1">
-            <a:schemeClr val="dk1"/>
-          </a:lnRef>
-          <a:fillRef idx="0">
-            <a:schemeClr val="dk1"/>
-          </a:fillRef>
-          <a:effectRef idx="0">
-            <a:schemeClr val="dk1"/>
-          </a:effectRef>
-          <a:fontRef idx="minor">
-            <a:schemeClr val="tx1"/>
-          </a:fontRef>
-        </p:style>
-      </p:cxnSp>
-      <p:cxnSp>
-        <p:nvCxnSpPr>
-          <p:cNvPr id="111" name="Curved Connector 110">
-            <a:extLst>
-              <a:ext uri="{FF2B5EF4-FFF2-40B4-BE49-F238E27FC236}">
-                <a16:creationId xmlns:a16="http://schemas.microsoft.com/office/drawing/2014/main" id="{A55F1B87-986E-BE40-A4C4-13DF22E1473D}"/>
-              </a:ext>
-            </a:extLst>
-          </p:cNvPr>
-          <p:cNvCxnSpPr>
-            <a:cxnSpLocks/>
-            <a:stCxn id="14" idx="3"/>
-            <a:endCxn id="16" idx="0"/>
-          </p:cNvCxnSpPr>
-          <p:nvPr/>
-        </p:nvCxnSpPr>
-        <p:spPr>
-          <a:xfrm>
-            <a:off x="1594423" y="4444173"/>
-            <a:ext cx="1492404" cy="764482"/>
-          </a:xfrm>
-          <a:prstGeom prst="curvedConnector2">
-            <a:avLst/>
-          </a:prstGeom>
-          <a:ln w="12700">
-            <a:tailEnd type="triangle" w="lg" len="med"/>
-          </a:ln>
-        </p:spPr>
-        <p:style>
-          <a:lnRef idx="1">
-            <a:schemeClr val="dk1"/>
-          </a:lnRef>
-          <a:fillRef idx="0">
-            <a:schemeClr val="dk1"/>
-          </a:fillRef>
-          <a:effectRef idx="0">
-            <a:schemeClr val="dk1"/>
-          </a:effectRef>
-          <a:fontRef idx="minor">
-            <a:schemeClr val="tx1"/>
-          </a:fontRef>
-        </p:style>
-      </p:cxnSp>
-      <p:cxnSp>
-        <p:nvCxnSpPr>
-          <p:cNvPr id="114" name="Curved Connector 113">
-            <a:extLst>
-              <a:ext uri="{FF2B5EF4-FFF2-40B4-BE49-F238E27FC236}">
-                <a16:creationId xmlns:a16="http://schemas.microsoft.com/office/drawing/2014/main" id="{E2873F3D-D9FE-1043-9EBF-234756EB2355}"/>
-              </a:ext>
-            </a:extLst>
-          </p:cNvPr>
-          <p:cNvCxnSpPr>
-            <a:cxnSpLocks/>
-            <a:stCxn id="8" idx="2"/>
-            <a:endCxn id="10" idx="0"/>
-          </p:cNvCxnSpPr>
-          <p:nvPr/>
-        </p:nvCxnSpPr>
-        <p:spPr>
-          <a:xfrm rot="16200000" flipH="1">
-            <a:off x="4181958" y="649411"/>
-            <a:ext cx="444443" cy="1473558"/>
-          </a:xfrm>
-          <a:prstGeom prst="curvedConnector3">
-            <a:avLst>
-              <a:gd name="adj1" fmla="val 50000"/>
-            </a:avLst>
-          </a:prstGeom>
-          <a:ln w="12700">
-            <a:tailEnd type="triangle" w="lg" len="med"/>
-          </a:ln>
-        </p:spPr>
-        <p:style>
-          <a:lnRef idx="1">
-            <a:schemeClr val="dk1"/>
-          </a:lnRef>
-          <a:fillRef idx="0">
-            <a:schemeClr val="dk1"/>
-          </a:fillRef>
-          <a:effectRef idx="0">
-            <a:schemeClr val="dk1"/>
-          </a:effectRef>
-          <a:fontRef idx="minor">
-            <a:schemeClr val="tx1"/>
-          </a:fontRef>
-        </p:style>
-      </p:cxnSp>
-      <p:cxnSp>
-        <p:nvCxnSpPr>
-          <p:cNvPr id="117" name="Curved Connector 116">
-            <a:extLst>
-              <a:ext uri="{FF2B5EF4-FFF2-40B4-BE49-F238E27FC236}">
-                <a16:creationId xmlns:a16="http://schemas.microsoft.com/office/drawing/2014/main" id="{395AB83C-EB83-F643-B1FD-ECE0D096B6DE}"/>
-              </a:ext>
-            </a:extLst>
-          </p:cNvPr>
-          <p:cNvCxnSpPr>
-            <a:cxnSpLocks/>
-            <a:stCxn id="8" idx="2"/>
-            <a:endCxn id="11" idx="0"/>
-          </p:cNvCxnSpPr>
-          <p:nvPr/>
-        </p:nvCxnSpPr>
-        <p:spPr>
-          <a:xfrm rot="5400000">
-            <a:off x="2727432" y="668443"/>
-            <a:ext cx="444443" cy="1435495"/>
-          </a:xfrm>
-          <a:prstGeom prst="curvedConnector3">
-            <a:avLst>
-              <a:gd name="adj1" fmla="val 50000"/>
-            </a:avLst>
-          </a:prstGeom>
-          <a:ln w="12700">
-            <a:tailEnd type="triangle" w="lg" len="med"/>
-          </a:ln>
-        </p:spPr>
-        <p:style>
-          <a:lnRef idx="1">
-            <a:schemeClr val="dk1"/>
-          </a:lnRef>
-          <a:fillRef idx="0">
-            <a:schemeClr val="dk1"/>
-          </a:fillRef>
-          <a:effectRef idx="0">
-            <a:schemeClr val="dk1"/>
-          </a:effectRef>
-          <a:fontRef idx="minor">
-            <a:schemeClr val="tx1"/>
-          </a:fontRef>
-        </p:style>
-      </p:cxnSp>
-      <p:cxnSp>
-        <p:nvCxnSpPr>
-          <p:cNvPr id="120" name="Curved Connector 119">
-            <a:extLst>
-              <a:ext uri="{FF2B5EF4-FFF2-40B4-BE49-F238E27FC236}">
-                <a16:creationId xmlns:a16="http://schemas.microsoft.com/office/drawing/2014/main" id="{6BEE2A96-2B19-2E45-B108-4DF58879FC6E}"/>
-              </a:ext>
-            </a:extLst>
-          </p:cNvPr>
-          <p:cNvCxnSpPr>
-            <a:cxnSpLocks/>
-            <a:stCxn id="9" idx="2"/>
-            <a:endCxn id="11" idx="0"/>
-          </p:cNvCxnSpPr>
-          <p:nvPr/>
-        </p:nvCxnSpPr>
-        <p:spPr>
-          <a:xfrm rot="16200000" flipH="1">
-            <a:off x="1372201" y="748708"/>
-            <a:ext cx="444444" cy="1274963"/>
-          </a:xfrm>
-          <a:prstGeom prst="curvedConnector3">
-            <a:avLst>
-              <a:gd name="adj1" fmla="val 50000"/>
-            </a:avLst>
-          </a:prstGeom>
-          <a:ln w="12700">
-            <a:tailEnd type="triangle" w="lg" len="med"/>
-          </a:ln>
-        </p:spPr>
-        <p:style>
-          <a:lnRef idx="1">
-            <a:schemeClr val="dk1"/>
-          </a:lnRef>
-          <a:fillRef idx="0">
-            <a:schemeClr val="dk1"/>
-          </a:fillRef>
-          <a:effectRef idx="0">
-            <a:schemeClr val="dk1"/>
-          </a:effectRef>
-          <a:fontRef idx="minor">
-            <a:schemeClr val="tx1"/>
-          </a:fontRef>
-        </p:style>
-      </p:cxnSp>
-    </p:spTree>
-    <p:extLst>
-      <p:ext uri="{BB962C8B-B14F-4D97-AF65-F5344CB8AC3E}">
-        <p14:creationId xmlns:p14="http://schemas.microsoft.com/office/powerpoint/2010/main" val="1417924721"/>
-      </p:ext>
-    </p:extLst>
-  </p:cSld>
-  <p:clrMapOvr>
-    <a:masterClrMapping/>
-  </p:clrMapOvr>
-</p:sld>
-</file>
-
-<file path=ppt/slides/slide2.xml><?xml version="1.0" encoding="utf-8"?>
-<p:sld xmlns:a="http://schemas.openxmlformats.org/drawingml/2006/main" xmlns:r="http://schemas.openxmlformats.org/officeDocument/2006/relationships" xmlns:p="http://schemas.openxmlformats.org/presentationml/2006/main">
-  <p:cSld>
-    <p:spTree>
-      <p:nvGrpSpPr>
-        <p:cNvPr id="1" name=""/>
-        <p:cNvGrpSpPr/>
-        <p:nvPr/>
-      </p:nvGrpSpPr>
-      <p:grpSpPr>
-        <a:xfrm>
-          <a:off x="0" y="0"/>
-          <a:ext cx="0" cy="0"/>
-          <a:chOff x="0" y="0"/>
-          <a:chExt cx="0" cy="0"/>
-        </a:xfrm>
-      </p:grpSpPr>
-      <mc:AlternateContent xmlns:mc="http://schemas.openxmlformats.org/markup-compatibility/2006">
-        <mc:Choice xmlns:a14="http://schemas.microsoft.com/office/drawing/2010/main" Requires="a14">
-          <p:sp>
-            <p:nvSpPr>
-              <p:cNvPr id="7" name="Rounded Rectangle 6">
-                <a:extLst>
-                  <a:ext uri="{FF2B5EF4-FFF2-40B4-BE49-F238E27FC236}">
-                    <a16:creationId xmlns:a16="http://schemas.microsoft.com/office/drawing/2014/main" id="{7DC20666-1DE7-324E-ACDD-412112E1E1CB}"/>
-                  </a:ext>
-                </a:extLst>
-              </p:cNvPr>
-              <p:cNvSpPr/>
-              <p:nvPr/>
-            </p:nvSpPr>
-            <p:spPr>
-              <a:xfrm>
-                <a:off x="6080038" y="399397"/>
-                <a:ext cx="964905" cy="805416"/>
-              </a:xfrm>
-              <a:prstGeom prst="roundRect">
-                <a:avLst/>
-              </a:prstGeom>
-            </p:spPr>
-            <p:style>
-              <a:lnRef idx="2">
-                <a:schemeClr val="dk1"/>
-              </a:lnRef>
-              <a:fillRef idx="1">
-                <a:schemeClr val="lt1"/>
-              </a:fillRef>
-              <a:effectRef idx="0">
-                <a:schemeClr val="dk1"/>
-              </a:effectRef>
-              <a:fontRef idx="minor">
-                <a:schemeClr val="dk1"/>
-              </a:fontRef>
-            </p:style>
-            <p:txBody>
-              <a:bodyPr rtlCol="0" anchor="ctr"/>
-              <a:lstStyle/>
-              <a:p>
-                <a:pPr algn="ctr"/>
-                <a14:m>
-                  <m:oMathPara xmlns:m="http://schemas.openxmlformats.org/officeDocument/2006/math">
-                    <m:oMathParaPr>
-                      <m:jc m:val="centerGroup"/>
-                    </m:oMathParaPr>
-                    <m:oMath xmlns:m="http://schemas.openxmlformats.org/officeDocument/2006/math">
-                      <m:sSubSup>
-                        <m:sSubSupPr>
-                          <m:ctrlPr>
-                            <a:rPr lang="en-US" sz="2400" i="1" smtClean="0">
-                              <a:solidFill>
-                                <a:prstClr val="black"/>
-                              </a:solidFill>
-                              <a:latin typeface="Cambria Math" panose="02040503050406030204" pitchFamily="18" charset="0"/>
-                            </a:rPr>
-                          </m:ctrlPr>
-                        </m:sSubSupPr>
-                        <m:e>
-                          <m:r>
-                            <a:rPr lang="en-US" sz="2400" i="1">
-                              <a:solidFill>
-                                <a:prstClr val="black"/>
-                              </a:solidFill>
-                              <a:latin typeface="Cambria Math" panose="02040503050406030204" pitchFamily="18" charset="0"/>
-                            </a:rPr>
-                            <m:t>𝑌</m:t>
-                          </m:r>
-                        </m:e>
-                        <m:sub>
-                          <m:r>
-                            <a:rPr lang="en-US" sz="2400" i="1">
-                              <a:solidFill>
-                                <a:prstClr val="black"/>
-                              </a:solidFill>
-                              <a:latin typeface="Cambria Math" panose="02040503050406030204" pitchFamily="18" charset="0"/>
-                            </a:rPr>
-                            <m:t>𝑡</m:t>
-                          </m:r>
-                        </m:sub>
-                        <m:sup>
-                          <m:r>
-                            <a:rPr lang="en-US" sz="2400" b="0" i="1" smtClean="0">
-                              <a:solidFill>
-                                <a:prstClr val="black"/>
-                              </a:solidFill>
-                              <a:latin typeface="Cambria Math" panose="02040503050406030204" pitchFamily="18" charset="0"/>
-                            </a:rPr>
-                            <m:t>𝑊</m:t>
-                          </m:r>
-                        </m:sup>
-                      </m:sSubSup>
-                    </m:oMath>
-                  </m:oMathPara>
-                </a14:m>
-                <a:endParaRPr lang="en-US" sz="2400" i="1" dirty="0">
-                  <a:solidFill>
-                    <a:prstClr val="black"/>
-                  </a:solidFill>
-                </a:endParaRPr>
-              </a:p>
-            </p:txBody>
-          </p:sp>
-        </mc:Choice>
-        <mc:Fallback>
-          <p:sp>
-            <p:nvSpPr>
-              <p:cNvPr id="7" name="Rounded Rectangle 6">
-                <a:extLst>
-                  <a:ext uri="{FF2B5EF4-FFF2-40B4-BE49-F238E27FC236}">
-                    <a16:creationId xmlns:a16="http://schemas.microsoft.com/office/drawing/2014/main" id="{7DC20666-1DE7-324E-ACDD-412112E1E1CB}"/>
-                  </a:ext>
-                </a:extLst>
-              </p:cNvPr>
-              <p:cNvSpPr>
-                <a:spLocks noRot="1" noChangeAspect="1" noMove="1" noResize="1" noEditPoints="1" noAdjustHandles="1" noChangeArrowheads="1" noChangeShapeType="1" noTextEdit="1"/>
-              </p:cNvSpPr>
-              <p:nvPr/>
-            </p:nvSpPr>
-            <p:spPr>
-              <a:xfrm>
-                <a:off x="6080038" y="399397"/>
-                <a:ext cx="964905" cy="805416"/>
-              </a:xfrm>
-              <a:prstGeom prst="roundRect">
-                <a:avLst/>
-              </a:prstGeom>
-              <a:blipFill>
-                <a:blip r:embed="rId3"/>
-                <a:stretch>
-                  <a:fillRect/>
-                </a:stretch>
-              </a:blipFill>
-            </p:spPr>
-            <p:txBody>
-              <a:bodyPr/>
-              <a:lstStyle/>
-              <a:p>
-                <a:r>
-                  <a:rPr lang="en-US">
-                    <a:noFill/>
-                  </a:rPr>
-                  <a:t> </a:t>
-                </a:r>
-              </a:p>
-            </p:txBody>
-          </p:sp>
-        </mc:Fallback>
-      </mc:AlternateContent>
-      <mc:AlternateContent xmlns:mc="http://schemas.openxmlformats.org/markup-compatibility/2006">
-        <mc:Choice xmlns:a14="http://schemas.microsoft.com/office/drawing/2010/main" Requires="a14">
-          <p:sp>
-            <p:nvSpPr>
-              <p:cNvPr id="8" name="Rounded Rectangle 7">
-                <a:extLst>
-                  <a:ext uri="{FF2B5EF4-FFF2-40B4-BE49-F238E27FC236}">
-                    <a16:creationId xmlns:a16="http://schemas.microsoft.com/office/drawing/2014/main" id="{131BC15C-59EF-B547-888E-70723CE44B51}"/>
-                  </a:ext>
-                </a:extLst>
-              </p:cNvPr>
-              <p:cNvSpPr/>
-              <p:nvPr/>
-            </p:nvSpPr>
-            <p:spPr>
-              <a:xfrm>
-                <a:off x="2186877" y="400288"/>
-                <a:ext cx="964905" cy="805416"/>
-              </a:xfrm>
-              <a:prstGeom prst="roundRect">
-                <a:avLst/>
-              </a:prstGeom>
-            </p:spPr>
-            <p:style>
-              <a:lnRef idx="2">
-                <a:schemeClr val="dk1"/>
-              </a:lnRef>
-              <a:fillRef idx="1">
-                <a:schemeClr val="lt1"/>
-              </a:fillRef>
-              <a:effectRef idx="0">
-                <a:schemeClr val="dk1"/>
-              </a:effectRef>
-              <a:fontRef idx="minor">
-                <a:schemeClr val="dk1"/>
-              </a:fontRef>
-            </p:style>
-            <p:txBody>
-              <a:bodyPr rtlCol="0" anchor="ctr"/>
-              <a:lstStyle/>
-              <a:p>
-                <a:pPr algn="ctr"/>
-                <a14:m>
-                  <m:oMathPara xmlns:m="http://schemas.openxmlformats.org/officeDocument/2006/math">
-                    <m:oMathParaPr>
-                      <m:jc m:val="centerGroup"/>
-                    </m:oMathParaPr>
-                    <m:oMath xmlns:m="http://schemas.openxmlformats.org/officeDocument/2006/math">
-                      <m:sSub>
-                        <m:sSubPr>
-                          <m:ctrlPr>
-                            <a:rPr lang="en-US" sz="2400" i="1" smtClean="0">
-                              <a:latin typeface="Cambria Math" panose="02040503050406030204" pitchFamily="18" charset="0"/>
-                            </a:rPr>
-                          </m:ctrlPr>
-                        </m:sSubPr>
-                        <m:e>
-                          <m:r>
-                            <a:rPr lang="en-US" sz="2400" b="0" i="1" smtClean="0">
-                              <a:latin typeface="Cambria Math" panose="02040503050406030204" pitchFamily="18" charset="0"/>
-                            </a:rPr>
-                            <m:t>𝑀</m:t>
-                          </m:r>
-                        </m:e>
-                        <m:sub>
-                          <m:r>
-                            <a:rPr lang="en-US" sz="2400" i="1">
-                              <a:latin typeface="Cambria Math" panose="02040503050406030204" pitchFamily="18" charset="0"/>
-                            </a:rPr>
-                            <m:t>𝑡</m:t>
-                          </m:r>
-                        </m:sub>
-                      </m:sSub>
-                    </m:oMath>
-                  </m:oMathPara>
-                </a14:m>
-                <a:endParaRPr lang="en-US" sz="2400" i="1" dirty="0"/>
-              </a:p>
-            </p:txBody>
-          </p:sp>
-        </mc:Choice>
-        <mc:Fallback>
-          <p:sp>
-            <p:nvSpPr>
-              <p:cNvPr id="8" name="Rounded Rectangle 7">
-                <a:extLst>
-                  <a:ext uri="{FF2B5EF4-FFF2-40B4-BE49-F238E27FC236}">
-                    <a16:creationId xmlns:a16="http://schemas.microsoft.com/office/drawing/2014/main" id="{131BC15C-59EF-B547-888E-70723CE44B51}"/>
-                  </a:ext>
-                </a:extLst>
-              </p:cNvPr>
-              <p:cNvSpPr>
-                <a:spLocks noRot="1" noChangeAspect="1" noMove="1" noResize="1" noEditPoints="1" noAdjustHandles="1" noChangeArrowheads="1" noChangeShapeType="1" noTextEdit="1"/>
-              </p:cNvSpPr>
-              <p:nvPr/>
-            </p:nvSpPr>
-            <p:spPr>
-              <a:xfrm>
-                <a:off x="2186877" y="400288"/>
-                <a:ext cx="964905" cy="805416"/>
-              </a:xfrm>
-              <a:prstGeom prst="roundRect">
-                <a:avLst/>
-              </a:prstGeom>
-              <a:blipFill>
-                <a:blip r:embed="rId4"/>
-                <a:stretch>
-                  <a:fillRect/>
-                </a:stretch>
-              </a:blipFill>
-            </p:spPr>
-            <p:txBody>
-              <a:bodyPr/>
-              <a:lstStyle/>
-              <a:p>
-                <a:r>
-                  <a:rPr lang="en-US">
-                    <a:noFill/>
-                  </a:rPr>
-                  <a:t> </a:t>
-                </a:r>
-              </a:p>
-            </p:txBody>
-          </p:sp>
-        </mc:Fallback>
-      </mc:AlternateContent>
-      <mc:AlternateContent xmlns:mc="http://schemas.openxmlformats.org/markup-compatibility/2006">
-        <mc:Choice xmlns:a14="http://schemas.microsoft.com/office/drawing/2010/main" Requires="a14">
-          <p:sp>
-            <p:nvSpPr>
-              <p:cNvPr id="9" name="Rounded Rectangle 8">
-                <a:extLst>
-                  <a:ext uri="{FF2B5EF4-FFF2-40B4-BE49-F238E27FC236}">
-                    <a16:creationId xmlns:a16="http://schemas.microsoft.com/office/drawing/2014/main" id="{E054EA09-CD09-804A-9C7C-177B564F4D4A}"/>
-                  </a:ext>
-                </a:extLst>
-              </p:cNvPr>
-              <p:cNvSpPr/>
-              <p:nvPr/>
-            </p:nvSpPr>
-            <p:spPr>
-              <a:xfrm>
-                <a:off x="474489" y="358552"/>
-                <a:ext cx="964905" cy="805416"/>
-              </a:xfrm>
-              <a:prstGeom prst="roundRect">
-                <a:avLst/>
-              </a:prstGeom>
-            </p:spPr>
-            <p:style>
-              <a:lnRef idx="2">
-                <a:schemeClr val="dk1"/>
-              </a:lnRef>
-              <a:fillRef idx="1">
-                <a:schemeClr val="lt1"/>
-              </a:fillRef>
-              <a:effectRef idx="0">
-                <a:schemeClr val="dk1"/>
-              </a:effectRef>
-              <a:fontRef idx="minor">
-                <a:schemeClr val="dk1"/>
-              </a:fontRef>
-            </p:style>
-            <p:txBody>
-              <a:bodyPr rtlCol="0" anchor="ctr"/>
-              <a:lstStyle/>
-              <a:p>
-                <a:pPr lvl="0" algn="ctr"/>
-                <a14:m>
-                  <m:oMathPara xmlns:m="http://schemas.openxmlformats.org/officeDocument/2006/math">
-                    <m:oMathParaPr>
-                      <m:jc m:val="centerGroup"/>
-                    </m:oMathParaPr>
-                    <m:oMath xmlns:m="http://schemas.openxmlformats.org/officeDocument/2006/math">
-                      <m:sSubSup>
-                        <m:sSubSupPr>
-                          <m:ctrlPr>
-                            <a:rPr lang="en-US" sz="2400" i="1" smtClean="0">
-                              <a:solidFill>
-                                <a:prstClr val="black"/>
-                              </a:solidFill>
-                              <a:latin typeface="Cambria Math" panose="02040503050406030204" pitchFamily="18" charset="0"/>
-                            </a:rPr>
-                          </m:ctrlPr>
-                        </m:sSubSupPr>
-                        <m:e>
-                          <m:r>
-                            <a:rPr lang="en-US" sz="2400" b="0" i="1" smtClean="0">
-                              <a:solidFill>
-                                <a:prstClr val="black"/>
-                              </a:solidFill>
-                              <a:latin typeface="Cambria Math" panose="02040503050406030204" pitchFamily="18" charset="0"/>
-                            </a:rPr>
-                            <m:t>𝑌</m:t>
-                          </m:r>
-                        </m:e>
-                        <m:sub>
-                          <m:r>
-                            <a:rPr lang="en-US" sz="2400" b="0" i="1" smtClean="0">
-                              <a:solidFill>
-                                <a:prstClr val="black"/>
-                              </a:solidFill>
-                              <a:latin typeface="Cambria Math" panose="02040503050406030204" pitchFamily="18" charset="0"/>
-                            </a:rPr>
-                            <m:t>𝑡</m:t>
-                          </m:r>
-                        </m:sub>
-                        <m:sup>
-                          <m:r>
-                            <a:rPr lang="en-US" sz="2400" b="0" i="1" smtClean="0">
-                              <a:solidFill>
-                                <a:prstClr val="black"/>
-                              </a:solidFill>
-                              <a:latin typeface="Cambria Math" panose="02040503050406030204" pitchFamily="18" charset="0"/>
-                            </a:rPr>
-                            <m:t>𝑇</m:t>
-                          </m:r>
-                        </m:sup>
-                      </m:sSubSup>
-                    </m:oMath>
-                  </m:oMathPara>
-                </a14:m>
-                <a:endParaRPr lang="en-US" sz="2400" i="1" dirty="0">
-                  <a:solidFill>
-                    <a:prstClr val="black"/>
-                  </a:solidFill>
-                </a:endParaRPr>
-              </a:p>
-            </p:txBody>
-          </p:sp>
-        </mc:Choice>
-        <mc:Fallback>
-          <p:sp>
-            <p:nvSpPr>
-              <p:cNvPr id="9" name="Rounded Rectangle 8">
-                <a:extLst>
-                  <a:ext uri="{FF2B5EF4-FFF2-40B4-BE49-F238E27FC236}">
-                    <a16:creationId xmlns:a16="http://schemas.microsoft.com/office/drawing/2014/main" id="{E054EA09-CD09-804A-9C7C-177B564F4D4A}"/>
-                  </a:ext>
-                </a:extLst>
-              </p:cNvPr>
-              <p:cNvSpPr>
-                <a:spLocks noRot="1" noChangeAspect="1" noMove="1" noResize="1" noEditPoints="1" noAdjustHandles="1" noChangeArrowheads="1" noChangeShapeType="1" noTextEdit="1"/>
-              </p:cNvSpPr>
-              <p:nvPr/>
-            </p:nvSpPr>
-            <p:spPr>
-              <a:xfrm>
-                <a:off x="474489" y="358552"/>
-                <a:ext cx="964905" cy="805416"/>
-              </a:xfrm>
-              <a:prstGeom prst="roundRect">
-                <a:avLst/>
-              </a:prstGeom>
-              <a:blipFill>
-                <a:blip r:embed="rId5"/>
-                <a:stretch>
-                  <a:fillRect/>
-                </a:stretch>
-              </a:blipFill>
-            </p:spPr>
-            <p:txBody>
-              <a:bodyPr/>
-              <a:lstStyle/>
-              <a:p>
-                <a:r>
-                  <a:rPr lang="en-US">
-                    <a:noFill/>
-                  </a:rPr>
-                  <a:t> </a:t>
-                </a:r>
-              </a:p>
-            </p:txBody>
-          </p:sp>
-        </mc:Fallback>
-      </mc:AlternateContent>
-      <mc:AlternateContent xmlns:mc="http://schemas.openxmlformats.org/markup-compatibility/2006">
-        <mc:Choice xmlns:a14="http://schemas.microsoft.com/office/drawing/2010/main" Requires="a14">
-          <p:sp>
-            <p:nvSpPr>
-              <p:cNvPr id="10" name="Rounded Rectangle 9">
-                <a:extLst>
-                  <a:ext uri="{FF2B5EF4-FFF2-40B4-BE49-F238E27FC236}">
-                    <a16:creationId xmlns:a16="http://schemas.microsoft.com/office/drawing/2014/main" id="{70F6C5E0-D8FE-B54B-B2CB-18CDEAEBC054}"/>
-                  </a:ext>
-                </a:extLst>
-              </p:cNvPr>
-              <p:cNvSpPr/>
-              <p:nvPr/>
-            </p:nvSpPr>
-            <p:spPr>
-              <a:xfrm>
-                <a:off x="4921602" y="1623099"/>
-                <a:ext cx="694866" cy="805416"/>
-              </a:xfrm>
-              <a:prstGeom prst="roundRect">
-                <a:avLst/>
-              </a:prstGeom>
-            </p:spPr>
-            <p:style>
-              <a:lnRef idx="2">
-                <a:schemeClr val="dk1">
-                  <a:shade val="50000"/>
-                </a:schemeClr>
-              </a:lnRef>
-              <a:fillRef idx="1">
-                <a:schemeClr val="dk1"/>
-              </a:fillRef>
-              <a:effectRef idx="0">
-                <a:schemeClr val="dk1"/>
-              </a:effectRef>
-              <a:fontRef idx="minor">
-                <a:schemeClr val="lt1"/>
-              </a:fontRef>
-            </p:style>
-            <p:txBody>
-              <a:bodyPr rtlCol="0" anchor="ctr"/>
-              <a:lstStyle/>
-              <a:p>
-                <a:pPr algn="ctr"/>
-                <a14:m>
-                  <m:oMathPara xmlns:m="http://schemas.openxmlformats.org/officeDocument/2006/math">
-                    <m:oMathParaPr>
-                      <m:jc m:val="centerGroup"/>
-                    </m:oMathParaPr>
-                    <m:oMath xmlns:m="http://schemas.openxmlformats.org/officeDocument/2006/math">
-                      <m:r>
-                        <a:rPr lang="en-US" sz="2400" b="0" i="1" smtClean="0">
-                          <a:latin typeface="Cambria Math" panose="02040503050406030204" pitchFamily="18" charset="0"/>
-                        </a:rPr>
-                        <m:t>𝑟</m:t>
-                      </m:r>
-                    </m:oMath>
-                  </m:oMathPara>
-                </a14:m>
-                <a:endParaRPr lang="en-US" sz="2400" dirty="0"/>
-              </a:p>
-            </p:txBody>
-          </p:sp>
-        </mc:Choice>
-        <mc:Fallback>
-          <p:sp>
-            <p:nvSpPr>
-              <p:cNvPr id="10" name="Rounded Rectangle 9">
-                <a:extLst>
-                  <a:ext uri="{FF2B5EF4-FFF2-40B4-BE49-F238E27FC236}">
-                    <a16:creationId xmlns:a16="http://schemas.microsoft.com/office/drawing/2014/main" id="{70F6C5E0-D8FE-B54B-B2CB-18CDEAEBC054}"/>
-                  </a:ext>
-                </a:extLst>
-              </p:cNvPr>
-              <p:cNvSpPr>
-                <a:spLocks noRot="1" noChangeAspect="1" noMove="1" noResize="1" noEditPoints="1" noAdjustHandles="1" noChangeArrowheads="1" noChangeShapeType="1" noTextEdit="1"/>
-              </p:cNvSpPr>
-              <p:nvPr/>
-            </p:nvSpPr>
-            <p:spPr>
-              <a:xfrm>
-                <a:off x="4921602" y="1623099"/>
-                <a:ext cx="694866" cy="805416"/>
-              </a:xfrm>
-              <a:prstGeom prst="roundRect">
-                <a:avLst/>
-              </a:prstGeom>
-              <a:blipFill>
-                <a:blip r:embed="rId6"/>
-                <a:stretch>
-                  <a:fillRect/>
-                </a:stretch>
-              </a:blipFill>
-            </p:spPr>
-            <p:txBody>
-              <a:bodyPr/>
-              <a:lstStyle/>
-              <a:p>
-                <a:r>
-                  <a:rPr lang="en-US">
-                    <a:noFill/>
-                  </a:rPr>
-                  <a:t> </a:t>
-                </a:r>
-              </a:p>
-            </p:txBody>
-          </p:sp>
-        </mc:Fallback>
-      </mc:AlternateContent>
-      <mc:AlternateContent xmlns:mc="http://schemas.openxmlformats.org/markup-compatibility/2006">
-        <mc:Choice xmlns:a14="http://schemas.microsoft.com/office/drawing/2010/main" Requires="a14">
-          <p:sp>
-            <p:nvSpPr>
-              <p:cNvPr id="11" name="Rounded Rectangle 10">
-                <a:extLst>
-                  <a:ext uri="{FF2B5EF4-FFF2-40B4-BE49-F238E27FC236}">
-                    <a16:creationId xmlns:a16="http://schemas.microsoft.com/office/drawing/2014/main" id="{FBA68ED4-9DE9-AF4A-8ED7-0163BC0042DE}"/>
-                  </a:ext>
-                </a:extLst>
-              </p:cNvPr>
-              <p:cNvSpPr/>
-              <p:nvPr/>
-            </p:nvSpPr>
-            <p:spPr>
-              <a:xfrm>
-                <a:off x="1492188" y="1558471"/>
-                <a:ext cx="639204" cy="805416"/>
-              </a:xfrm>
-              <a:prstGeom prst="roundRect">
-                <a:avLst/>
-              </a:prstGeom>
-            </p:spPr>
-            <p:style>
-              <a:lnRef idx="2">
-                <a:schemeClr val="dk1">
-                  <a:shade val="50000"/>
-                </a:schemeClr>
-              </a:lnRef>
-              <a:fillRef idx="1">
-                <a:schemeClr val="dk1"/>
-              </a:fillRef>
-              <a:effectRef idx="0">
-                <a:schemeClr val="dk1"/>
-              </a:effectRef>
-              <a:fontRef idx="minor">
-                <a:schemeClr val="lt1"/>
-              </a:fontRef>
-            </p:style>
-            <p:txBody>
-              <a:bodyPr rtlCol="0" anchor="ctr"/>
-              <a:lstStyle/>
-              <a:p>
-                <a:pPr algn="ctr"/>
-                <a14:m>
-                  <m:oMathPara xmlns:m="http://schemas.openxmlformats.org/officeDocument/2006/math">
-                    <m:oMathParaPr>
-                      <m:jc m:val="centerGroup"/>
-                    </m:oMathParaPr>
-                    <m:oMath xmlns:m="http://schemas.openxmlformats.org/officeDocument/2006/math">
-                      <m:sSub>
-                        <m:sSubPr>
-                          <m:ctrlPr>
-                            <a:rPr lang="en-US" sz="2400" i="1" smtClean="0">
-                              <a:latin typeface="Cambria Math" panose="02040503050406030204" pitchFamily="18" charset="0"/>
-                              <a:ea typeface="Cambria Math" panose="02040503050406030204" pitchFamily="18" charset="0"/>
-                            </a:rPr>
-                          </m:ctrlPr>
-                        </m:sSubPr>
-                        <m:e>
-                          <m:r>
-                            <a:rPr lang="en-US" sz="2400" i="1">
-                              <a:latin typeface="Cambria Math" panose="02040503050406030204" pitchFamily="18" charset="0"/>
-                              <a:ea typeface="Cambria Math" panose="02040503050406030204" pitchFamily="18" charset="0"/>
-                            </a:rPr>
-                            <m:t>𝜈</m:t>
-                          </m:r>
-                        </m:e>
-                        <m:sub>
-                          <m:r>
-                            <a:rPr lang="en-US" sz="2400" b="0" i="1" smtClean="0">
-                              <a:latin typeface="Cambria Math" panose="02040503050406030204" pitchFamily="18" charset="0"/>
-                              <a:ea typeface="Cambria Math" panose="02040503050406030204" pitchFamily="18" charset="0"/>
-                            </a:rPr>
-                            <m:t>𝑡</m:t>
-                          </m:r>
-                        </m:sub>
-                      </m:sSub>
-                    </m:oMath>
-                  </m:oMathPara>
-                </a14:m>
-                <a:endParaRPr lang="en-US" sz="2400" dirty="0"/>
-              </a:p>
-            </p:txBody>
-          </p:sp>
-        </mc:Choice>
-        <mc:Fallback>
-          <p:sp>
-            <p:nvSpPr>
-              <p:cNvPr id="11" name="Rounded Rectangle 10">
-                <a:extLst>
-                  <a:ext uri="{FF2B5EF4-FFF2-40B4-BE49-F238E27FC236}">
-                    <a16:creationId xmlns:a16="http://schemas.microsoft.com/office/drawing/2014/main" id="{FBA68ED4-9DE9-AF4A-8ED7-0163BC0042DE}"/>
-                  </a:ext>
-                </a:extLst>
-              </p:cNvPr>
-              <p:cNvSpPr>
-                <a:spLocks noRot="1" noChangeAspect="1" noMove="1" noResize="1" noEditPoints="1" noAdjustHandles="1" noChangeArrowheads="1" noChangeShapeType="1" noTextEdit="1"/>
-              </p:cNvSpPr>
-              <p:nvPr/>
-            </p:nvSpPr>
-            <p:spPr>
-              <a:xfrm>
-                <a:off x="1492188" y="1558471"/>
-                <a:ext cx="639204" cy="805416"/>
-              </a:xfrm>
-              <a:prstGeom prst="roundRect">
-                <a:avLst/>
-              </a:prstGeom>
-              <a:blipFill>
-                <a:blip r:embed="rId7"/>
-                <a:stretch>
-                  <a:fillRect/>
-                </a:stretch>
-              </a:blipFill>
-            </p:spPr>
-            <p:txBody>
-              <a:bodyPr/>
-              <a:lstStyle/>
-              <a:p>
-                <a:r>
-                  <a:rPr lang="en-US">
-                    <a:noFill/>
-                  </a:rPr>
-                  <a:t> </a:t>
-                </a:r>
-              </a:p>
-            </p:txBody>
-          </p:sp>
-        </mc:Fallback>
-      </mc:AlternateContent>
-      <mc:AlternateContent xmlns:mc="http://schemas.openxmlformats.org/markup-compatibility/2006">
-        <mc:Choice xmlns:a14="http://schemas.microsoft.com/office/drawing/2010/main" Requires="a14">
-          <p:sp>
-            <p:nvSpPr>
-              <p:cNvPr id="12" name="Rounded Rectangle 11">
-                <a:extLst>
-                  <a:ext uri="{FF2B5EF4-FFF2-40B4-BE49-F238E27FC236}">
-                    <a16:creationId xmlns:a16="http://schemas.microsoft.com/office/drawing/2014/main" id="{B278A405-9186-9740-9EC9-1AB7CF626AB4}"/>
-                  </a:ext>
-                </a:extLst>
-              </p:cNvPr>
-              <p:cNvSpPr/>
-              <p:nvPr/>
-            </p:nvSpPr>
-            <p:spPr>
-              <a:xfrm>
-                <a:off x="2538927" y="2775906"/>
-                <a:ext cx="1161144" cy="805416"/>
-              </a:xfrm>
-              <a:prstGeom prst="roundRect">
-                <a:avLst/>
-              </a:prstGeom>
-            </p:spPr>
-            <p:style>
-              <a:lnRef idx="1">
-                <a:schemeClr val="accent3"/>
-              </a:lnRef>
-              <a:fillRef idx="2">
-                <a:schemeClr val="accent3"/>
-              </a:fillRef>
-              <a:effectRef idx="1">
-                <a:schemeClr val="accent3"/>
-              </a:effectRef>
-              <a:fontRef idx="minor">
-                <a:schemeClr val="dk1"/>
-              </a:fontRef>
-            </p:style>
-            <p:txBody>
-              <a:bodyPr rtlCol="0" anchor="ctr"/>
-              <a:lstStyle/>
-              <a:p>
-                <a:pPr algn="ctr"/>
-                <a14:m>
-                  <m:oMathPara xmlns:m="http://schemas.openxmlformats.org/officeDocument/2006/math">
-                    <m:oMathParaPr>
-                      <m:jc m:val="centerGroup"/>
-                    </m:oMathParaPr>
-                    <m:oMath xmlns:m="http://schemas.openxmlformats.org/officeDocument/2006/math">
-                      <m:sSub>
-                        <m:sSubPr>
-                          <m:ctrlPr>
-                            <a:rPr lang="en-US" sz="2400" i="1" smtClean="0">
-                              <a:latin typeface="Cambria Math" panose="02040503050406030204" pitchFamily="18" charset="0"/>
-                            </a:rPr>
-                          </m:ctrlPr>
-                        </m:sSubPr>
-                        <m:e>
-                          <m:r>
-                            <a:rPr lang="en-US" sz="2400" b="0" i="1" smtClean="0">
-                              <a:latin typeface="Cambria Math" panose="02040503050406030204" pitchFamily="18" charset="0"/>
-                              <a:ea typeface="Cambria Math" panose="02040503050406030204" pitchFamily="18" charset="0"/>
-                            </a:rPr>
-                            <m:t>𝑋</m:t>
-                          </m:r>
-                        </m:e>
-                        <m:sub>
-                          <m:r>
-                            <a:rPr lang="en-US" sz="2400" i="1">
-                              <a:latin typeface="Cambria Math" panose="02040503050406030204" pitchFamily="18" charset="0"/>
-                            </a:rPr>
-                            <m:t>𝑡</m:t>
-                          </m:r>
-                        </m:sub>
-                      </m:sSub>
-                    </m:oMath>
-                  </m:oMathPara>
-                </a14:m>
-                <a:endParaRPr lang="en-US" sz="2400" i="1" dirty="0"/>
-              </a:p>
-            </p:txBody>
-          </p:sp>
-        </mc:Choice>
-        <mc:Fallback>
-          <p:sp>
-            <p:nvSpPr>
-              <p:cNvPr id="12" name="Rounded Rectangle 11">
-                <a:extLst>
-                  <a:ext uri="{FF2B5EF4-FFF2-40B4-BE49-F238E27FC236}">
-                    <a16:creationId xmlns:a16="http://schemas.microsoft.com/office/drawing/2014/main" id="{B278A405-9186-9740-9EC9-1AB7CF626AB4}"/>
-                  </a:ext>
-                </a:extLst>
-              </p:cNvPr>
-              <p:cNvSpPr>
-                <a:spLocks noRot="1" noChangeAspect="1" noMove="1" noResize="1" noEditPoints="1" noAdjustHandles="1" noChangeArrowheads="1" noChangeShapeType="1" noTextEdit="1"/>
-              </p:cNvSpPr>
-              <p:nvPr/>
-            </p:nvSpPr>
-            <p:spPr>
-              <a:xfrm>
-                <a:off x="2538927" y="2775906"/>
-                <a:ext cx="1161144" cy="805416"/>
-              </a:xfrm>
-              <a:prstGeom prst="roundRect">
-                <a:avLst/>
-              </a:prstGeom>
-              <a:blipFill>
-                <a:blip r:embed="rId8"/>
-                <a:stretch>
-                  <a:fillRect/>
-                </a:stretch>
-              </a:blipFill>
-            </p:spPr>
-            <p:txBody>
-              <a:bodyPr/>
-              <a:lstStyle/>
-              <a:p>
-                <a:r>
-                  <a:rPr lang="en-US">
-                    <a:noFill/>
-                  </a:rPr>
-                  <a:t> </a:t>
-                </a:r>
-              </a:p>
-            </p:txBody>
-          </p:sp>
-        </mc:Fallback>
-      </mc:AlternateContent>
-      <mc:AlternateContent xmlns:mc="http://schemas.openxmlformats.org/markup-compatibility/2006">
-        <mc:Choice xmlns:a14="http://schemas.microsoft.com/office/drawing/2010/main" Requires="a14">
-          <p:sp>
-            <p:nvSpPr>
-              <p:cNvPr id="13" name="Rounded Rectangle 12">
-                <a:extLst>
-                  <a:ext uri="{FF2B5EF4-FFF2-40B4-BE49-F238E27FC236}">
-                    <a16:creationId xmlns:a16="http://schemas.microsoft.com/office/drawing/2014/main" id="{50BE2044-D52D-AB46-9595-D7101257EE2F}"/>
-                  </a:ext>
-                </a:extLst>
-              </p:cNvPr>
-              <p:cNvSpPr/>
-              <p:nvPr/>
-            </p:nvSpPr>
-            <p:spPr>
-              <a:xfrm>
-                <a:off x="5957529" y="2596113"/>
-                <a:ext cx="677364" cy="805416"/>
-              </a:xfrm>
-              <a:prstGeom prst="roundRect">
-                <a:avLst/>
-              </a:prstGeom>
-            </p:spPr>
-            <p:style>
-              <a:lnRef idx="2">
-                <a:schemeClr val="dk1">
-                  <a:shade val="50000"/>
-                </a:schemeClr>
-              </a:lnRef>
-              <a:fillRef idx="1">
-                <a:schemeClr val="dk1"/>
-              </a:fillRef>
-              <a:effectRef idx="0">
-                <a:schemeClr val="dk1"/>
-              </a:effectRef>
-              <a:fontRef idx="minor">
-                <a:schemeClr val="lt1"/>
-              </a:fontRef>
-            </p:style>
-            <p:txBody>
-              <a:bodyPr rtlCol="0" anchor="ctr"/>
-              <a:lstStyle/>
-              <a:p>
-                <a:pPr algn="ctr"/>
-                <a14:m>
-                  <m:oMathPara xmlns:m="http://schemas.openxmlformats.org/officeDocument/2006/math">
-                    <m:oMathParaPr>
-                      <m:jc m:val="centerGroup"/>
-                    </m:oMathParaPr>
-                    <m:oMath xmlns:m="http://schemas.openxmlformats.org/officeDocument/2006/math">
-                      <m:sSub>
-                        <m:sSubPr>
-                          <m:ctrlPr>
-                            <a:rPr lang="en-US" sz="2400" i="1">
-                              <a:latin typeface="Cambria Math" panose="02040503050406030204" pitchFamily="18" charset="0"/>
-                            </a:rPr>
-                          </m:ctrlPr>
-                        </m:sSubPr>
-                        <m:e>
-                          <m:r>
-                            <a:rPr lang="en-US" sz="2400" i="1" smtClean="0">
-                              <a:latin typeface="Cambria Math" panose="02040503050406030204" pitchFamily="18" charset="0"/>
-                              <a:ea typeface="Cambria Math" panose="02040503050406030204" pitchFamily="18" charset="0"/>
-                            </a:rPr>
-                            <m:t>𝜂</m:t>
-                          </m:r>
-                        </m:e>
-                        <m:sub>
-                          <m:r>
-                            <a:rPr lang="en-US" sz="2400" i="1">
-                              <a:latin typeface="Cambria Math" panose="02040503050406030204" pitchFamily="18" charset="0"/>
-                            </a:rPr>
-                            <m:t>𝑡</m:t>
-                          </m:r>
-                        </m:sub>
-                      </m:sSub>
-                    </m:oMath>
-                  </m:oMathPara>
-                </a14:m>
-                <a:endParaRPr lang="en-US" sz="2400" dirty="0"/>
-              </a:p>
-            </p:txBody>
-          </p:sp>
-        </mc:Choice>
-        <mc:Fallback>
-          <p:sp>
-            <p:nvSpPr>
-              <p:cNvPr id="13" name="Rounded Rectangle 12">
-                <a:extLst>
-                  <a:ext uri="{FF2B5EF4-FFF2-40B4-BE49-F238E27FC236}">
-                    <a16:creationId xmlns:a16="http://schemas.microsoft.com/office/drawing/2014/main" id="{50BE2044-D52D-AB46-9595-D7101257EE2F}"/>
-                  </a:ext>
-                </a:extLst>
-              </p:cNvPr>
-              <p:cNvSpPr>
-                <a:spLocks noRot="1" noChangeAspect="1" noMove="1" noResize="1" noEditPoints="1" noAdjustHandles="1" noChangeArrowheads="1" noChangeShapeType="1" noTextEdit="1"/>
-              </p:cNvSpPr>
-              <p:nvPr/>
-            </p:nvSpPr>
-            <p:spPr>
-              <a:xfrm>
-                <a:off x="5957529" y="2596113"/>
-                <a:ext cx="677364" cy="805416"/>
-              </a:xfrm>
-              <a:prstGeom prst="roundRect">
-                <a:avLst/>
-              </a:prstGeom>
-              <a:blipFill>
-                <a:blip r:embed="rId9"/>
-                <a:stretch>
-                  <a:fillRect/>
-                </a:stretch>
-              </a:blipFill>
-            </p:spPr>
-            <p:txBody>
-              <a:bodyPr/>
-              <a:lstStyle/>
-              <a:p>
-                <a:r>
-                  <a:rPr lang="en-US">
-                    <a:noFill/>
-                  </a:rPr>
-                  <a:t> </a:t>
-                </a:r>
-              </a:p>
-            </p:txBody>
-          </p:sp>
-        </mc:Fallback>
-      </mc:AlternateContent>
-      <mc:AlternateContent xmlns:mc="http://schemas.openxmlformats.org/markup-compatibility/2006">
-        <mc:Choice xmlns:a14="http://schemas.microsoft.com/office/drawing/2010/main" Requires="a14">
-          <p:sp>
-            <p:nvSpPr>
-              <p:cNvPr id="14" name="Rounded Rectangle 13">
-                <a:extLst>
-                  <a:ext uri="{FF2B5EF4-FFF2-40B4-BE49-F238E27FC236}">
-                    <a16:creationId xmlns:a16="http://schemas.microsoft.com/office/drawing/2014/main" id="{394E90F3-4253-3F40-80BF-6E7119F0E48A}"/>
-                  </a:ext>
-                </a:extLst>
-              </p:cNvPr>
-              <p:cNvSpPr/>
-              <p:nvPr/>
-            </p:nvSpPr>
-            <p:spPr>
-              <a:xfrm>
-                <a:off x="390516" y="3696413"/>
-                <a:ext cx="1274964" cy="1150468"/>
-              </a:xfrm>
-              <a:prstGeom prst="roundRect">
-                <a:avLst/>
-              </a:prstGeom>
-            </p:spPr>
-            <p:style>
-              <a:lnRef idx="2">
-                <a:schemeClr val="dk1">
-                  <a:shade val="50000"/>
-                </a:schemeClr>
-              </a:lnRef>
-              <a:fillRef idx="1">
-                <a:schemeClr val="dk1"/>
-              </a:fillRef>
-              <a:effectRef idx="0">
-                <a:schemeClr val="dk1"/>
-              </a:effectRef>
-              <a:fontRef idx="minor">
-                <a:schemeClr val="lt1"/>
-              </a:fontRef>
-            </p:style>
-            <p:txBody>
-              <a:bodyPr rtlCol="0" anchor="ctr"/>
-              <a:lstStyle/>
-              <a:p>
-                <a:pPr algn="ctr"/>
-                <a14:m>
-                  <m:oMathPara xmlns:m="http://schemas.openxmlformats.org/officeDocument/2006/math">
-                    <m:oMathParaPr>
-                      <m:jc m:val="centerGroup"/>
-                    </m:oMathParaPr>
-                    <m:oMath xmlns:m="http://schemas.openxmlformats.org/officeDocument/2006/math">
-                      <m:m>
-                        <m:mPr>
-                          <m:mcs>
-                            <m:mc>
-                              <m:mcPr>
-                                <m:count m:val="1"/>
-                                <m:mcJc m:val="center"/>
-                              </m:mcPr>
-                            </m:mc>
-                          </m:mcs>
-                          <m:ctrlPr>
-                            <a:rPr lang="en-US" sz="2400" i="1" smtClean="0">
-                              <a:latin typeface="Cambria Math" panose="02040503050406030204" pitchFamily="18" charset="0"/>
-                            </a:rPr>
-                          </m:ctrlPr>
-                        </m:mPr>
-                        <m:mr>
-                          <m:e>
-                            <m:sSub>
-                              <m:sSubPr>
-                                <m:ctrlPr>
-                                  <a:rPr lang="en-US" sz="2400" i="1" smtClean="0">
-                                    <a:latin typeface="Cambria Math" panose="02040503050406030204" pitchFamily="18" charset="0"/>
-                                  </a:rPr>
-                                </m:ctrlPr>
-                              </m:sSubPr>
-                              <m:e>
-                                <m:r>
-                                  <a:rPr lang="en-US" sz="2400" i="1" smtClean="0">
-                                    <a:latin typeface="Cambria Math" panose="02040503050406030204" pitchFamily="18" charset="0"/>
-                                    <a:ea typeface="Cambria Math" panose="02040503050406030204" pitchFamily="18" charset="0"/>
-                                  </a:rPr>
-                                  <m:t>𝜔</m:t>
-                                </m:r>
-                              </m:e>
-                              <m:sub>
-                                <m:r>
-                                  <a:rPr lang="en-US" sz="2400" b="0" i="1" smtClean="0">
-                                    <a:latin typeface="Cambria Math" panose="02040503050406030204" pitchFamily="18" charset="0"/>
-                                  </a:rPr>
-                                  <m:t>𝑤</m:t>
-                                </m:r>
-                                <m:r>
-                                  <a:rPr lang="en-US" sz="2400" b="0" i="1" smtClean="0">
-                                    <a:latin typeface="Cambria Math" panose="02040503050406030204" pitchFamily="18" charset="0"/>
-                                  </a:rPr>
-                                  <m:t>,</m:t>
-                                </m:r>
-                                <m:r>
-                                  <a:rPr lang="en-US" sz="2400" b="0" i="1" smtClean="0">
-                                    <a:latin typeface="Cambria Math" panose="02040503050406030204" pitchFamily="18" charset="0"/>
-                                  </a:rPr>
-                                  <m:t>𝑡</m:t>
-                                </m:r>
-                              </m:sub>
-                            </m:sSub>
-                          </m:e>
-                        </m:mr>
-                        <m:mr>
-                          <m:e>
-                            <m:sSub>
-                              <m:sSubPr>
-                                <m:ctrlPr>
-                                  <a:rPr lang="en-US" sz="2400" i="1" smtClean="0">
-                                    <a:latin typeface="Cambria Math" panose="02040503050406030204" pitchFamily="18" charset="0"/>
-                                  </a:rPr>
-                                </m:ctrlPr>
-                              </m:sSubPr>
-                              <m:e>
-                                <m:r>
-                                  <a:rPr lang="en-US" sz="2400" i="1" smtClean="0">
-                                    <a:latin typeface="Cambria Math" panose="02040503050406030204" pitchFamily="18" charset="0"/>
-                                    <a:ea typeface="Cambria Math" panose="02040503050406030204" pitchFamily="18" charset="0"/>
-                                  </a:rPr>
-                                  <m:t>𝜔</m:t>
-                                </m:r>
-                              </m:e>
-                              <m:sub>
-                                <m:r>
-                                  <a:rPr lang="en-US" sz="2400" b="0" i="1" smtClean="0">
-                                    <a:latin typeface="Cambria Math" panose="02040503050406030204" pitchFamily="18" charset="0"/>
-                                  </a:rPr>
-                                  <m:t>h𝑐</m:t>
-                                </m:r>
-                                <m:r>
-                                  <a:rPr lang="en-US" sz="2400" b="0" i="1" smtClean="0">
-                                    <a:latin typeface="Cambria Math" panose="02040503050406030204" pitchFamily="18" charset="0"/>
-                                  </a:rPr>
-                                  <m:t>,</m:t>
-                                </m:r>
-                                <m:r>
-                                  <a:rPr lang="en-US" sz="2400" b="0" i="1" smtClean="0">
-                                    <a:latin typeface="Cambria Math" panose="02040503050406030204" pitchFamily="18" charset="0"/>
-                                  </a:rPr>
-                                  <m:t>𝑡</m:t>
-                                </m:r>
-                              </m:sub>
-                            </m:sSub>
-                          </m:e>
-                        </m:mr>
-                        <m:mr>
-                          <m:e>
-                            <m:sSub>
-                              <m:sSubPr>
-                                <m:ctrlPr>
-                                  <a:rPr lang="en-US" sz="2400" i="1" smtClean="0">
-                                    <a:latin typeface="Cambria Math" panose="02040503050406030204" pitchFamily="18" charset="0"/>
-                                  </a:rPr>
-                                </m:ctrlPr>
-                              </m:sSubPr>
-                              <m:e>
-                                <m:r>
-                                  <a:rPr lang="en-US" sz="2400" i="1" smtClean="0">
-                                    <a:latin typeface="Cambria Math" panose="02040503050406030204" pitchFamily="18" charset="0"/>
-                                    <a:ea typeface="Cambria Math" panose="02040503050406030204" pitchFamily="18" charset="0"/>
-                                  </a:rPr>
-                                  <m:t>𝜔</m:t>
-                                </m:r>
-                              </m:e>
-                              <m:sub>
-                                <m:r>
-                                  <a:rPr lang="en-US" sz="2400" b="0" i="1" smtClean="0">
-                                    <a:latin typeface="Cambria Math" panose="02040503050406030204" pitchFamily="18" charset="0"/>
-                                  </a:rPr>
-                                  <m:t>h𝑛𝑐</m:t>
-                                </m:r>
-                                <m:r>
-                                  <a:rPr lang="en-US" sz="2400" b="0" i="1" smtClean="0">
-                                    <a:latin typeface="Cambria Math" panose="02040503050406030204" pitchFamily="18" charset="0"/>
-                                  </a:rPr>
-                                  <m:t>,</m:t>
-                                </m:r>
-                                <m:r>
-                                  <a:rPr lang="en-US" sz="2400" b="0" i="1" smtClean="0">
-                                    <a:latin typeface="Cambria Math" panose="02040503050406030204" pitchFamily="18" charset="0"/>
-                                  </a:rPr>
-                                  <m:t>𝑡</m:t>
-                                </m:r>
-                              </m:sub>
-                            </m:sSub>
-                          </m:e>
-                        </m:mr>
-                      </m:m>
-                    </m:oMath>
-                  </m:oMathPara>
-                </a14:m>
-                <a:endParaRPr lang="en-US" sz="2400" dirty="0"/>
-              </a:p>
-            </p:txBody>
-          </p:sp>
-        </mc:Choice>
-        <mc:Fallback>
-          <p:sp>
-            <p:nvSpPr>
-              <p:cNvPr id="14" name="Rounded Rectangle 13">
-                <a:extLst>
-                  <a:ext uri="{FF2B5EF4-FFF2-40B4-BE49-F238E27FC236}">
-                    <a16:creationId xmlns:a16="http://schemas.microsoft.com/office/drawing/2014/main" id="{394E90F3-4253-3F40-80BF-6E7119F0E48A}"/>
-                  </a:ext>
-                </a:extLst>
-              </p:cNvPr>
-              <p:cNvSpPr>
-                <a:spLocks noRot="1" noChangeAspect="1" noMove="1" noResize="1" noEditPoints="1" noAdjustHandles="1" noChangeArrowheads="1" noChangeShapeType="1" noTextEdit="1"/>
-              </p:cNvSpPr>
-              <p:nvPr/>
-            </p:nvSpPr>
-            <p:spPr>
-              <a:xfrm>
-                <a:off x="390516" y="3696413"/>
-                <a:ext cx="1274964" cy="1150468"/>
-              </a:xfrm>
-              <a:prstGeom prst="roundRect">
-                <a:avLst/>
-              </a:prstGeom>
-              <a:blipFill>
-                <a:blip r:embed="rId10"/>
-                <a:stretch>
-                  <a:fillRect/>
-                </a:stretch>
-              </a:blipFill>
-            </p:spPr>
-            <p:txBody>
-              <a:bodyPr/>
-              <a:lstStyle/>
-              <a:p>
-                <a:r>
-                  <a:rPr lang="en-US">
-                    <a:noFill/>
-                  </a:rPr>
-                  <a:t> </a:t>
-                </a:r>
-              </a:p>
-            </p:txBody>
-          </p:sp>
-        </mc:Fallback>
-      </mc:AlternateContent>
-      <mc:AlternateContent xmlns:mc="http://schemas.openxmlformats.org/markup-compatibility/2006">
-        <mc:Choice xmlns:a14="http://schemas.microsoft.com/office/drawing/2010/main" Requires="a14">
-          <p:sp>
-            <p:nvSpPr>
-              <p:cNvPr id="15" name="Rounded Rectangle 14">
-                <a:extLst>
-                  <a:ext uri="{FF2B5EF4-FFF2-40B4-BE49-F238E27FC236}">
-                    <a16:creationId xmlns:a16="http://schemas.microsoft.com/office/drawing/2014/main" id="{484AB6B6-EBA3-9649-8407-BEDE06BB3C00}"/>
-                  </a:ext>
-                </a:extLst>
-              </p:cNvPr>
-              <p:cNvSpPr/>
-              <p:nvPr/>
-            </p:nvSpPr>
-            <p:spPr>
-              <a:xfrm>
-                <a:off x="4247970" y="4041465"/>
-                <a:ext cx="2033559" cy="540474"/>
-              </a:xfrm>
-              <a:prstGeom prst="roundRect">
-                <a:avLst/>
-              </a:prstGeom>
-            </p:spPr>
-            <p:style>
-              <a:lnRef idx="1">
-                <a:schemeClr val="accent3"/>
-              </a:lnRef>
-              <a:fillRef idx="2">
-                <a:schemeClr val="accent3"/>
-              </a:fillRef>
-              <a:effectRef idx="1">
-                <a:schemeClr val="accent3"/>
-              </a:effectRef>
-              <a:fontRef idx="minor">
-                <a:schemeClr val="dk1"/>
-              </a:fontRef>
-            </p:style>
-            <p:txBody>
-              <a:bodyPr rtlCol="0" anchor="ctr"/>
-              <a:lstStyle/>
-              <a:p>
-                <a:pPr algn="ctr"/>
-                <a14:m>
-                  <m:oMathPara xmlns:m="http://schemas.openxmlformats.org/officeDocument/2006/math">
-                    <m:oMathParaPr>
-                      <m:jc m:val="centerGroup"/>
-                    </m:oMathParaPr>
-                    <m:oMath xmlns:m="http://schemas.openxmlformats.org/officeDocument/2006/math">
-                      <m:sSub>
-                        <m:sSubPr>
-                          <m:ctrlPr>
-                            <a:rPr lang="en-US" sz="2400" i="1" smtClean="0">
-                              <a:latin typeface="Cambria Math" panose="02040503050406030204" pitchFamily="18" charset="0"/>
-                            </a:rPr>
-                          </m:ctrlPr>
-                        </m:sSubPr>
-                        <m:e>
-                          <m:r>
-                            <a:rPr lang="en-US" sz="2400" i="1">
-                              <a:latin typeface="Cambria Math" panose="02040503050406030204" pitchFamily="18" charset="0"/>
-                              <a:ea typeface="Cambria Math" panose="02040503050406030204" pitchFamily="18" charset="0"/>
-                            </a:rPr>
-                            <m:t>𝑋</m:t>
-                          </m:r>
-                        </m:e>
-                        <m:sub>
-                          <m:r>
-                            <a:rPr lang="en-US" sz="2400" i="1">
-                              <a:latin typeface="Cambria Math" panose="02040503050406030204" pitchFamily="18" charset="0"/>
-                            </a:rPr>
-                            <m:t>𝑡</m:t>
-                          </m:r>
-                        </m:sub>
-                      </m:sSub>
-                      <m:r>
-                        <a:rPr lang="en-US" sz="2400" b="0" i="1" smtClean="0">
-                          <a:latin typeface="Cambria Math" panose="02040503050406030204" pitchFamily="18" charset="0"/>
-                        </a:rPr>
-                        <m:t>∗</m:t>
-                      </m:r>
-                      <m:d>
-                        <m:dPr>
-                          <m:ctrlPr>
-                            <a:rPr lang="en-US" sz="2400" b="0" i="1" smtClean="0">
-                              <a:latin typeface="Cambria Math" panose="02040503050406030204" pitchFamily="18" charset="0"/>
-                            </a:rPr>
-                          </m:ctrlPr>
-                        </m:dPr>
-                        <m:e>
-                          <m:r>
-                            <a:rPr lang="en-US" sz="2400" b="0" i="1" smtClean="0">
-                              <a:latin typeface="Cambria Math" panose="02040503050406030204" pitchFamily="18" charset="0"/>
-                            </a:rPr>
-                            <m:t>1 −</m:t>
-                          </m:r>
-                          <m:sSub>
-                            <m:sSubPr>
-                              <m:ctrlPr>
-                                <a:rPr lang="en-US" sz="2400" b="0" i="1" smtClean="0">
-                                  <a:latin typeface="Cambria Math" panose="02040503050406030204" pitchFamily="18" charset="0"/>
-                                </a:rPr>
-                              </m:ctrlPr>
-                            </m:sSubPr>
-                            <m:e>
-                              <m:r>
-                                <a:rPr lang="en-US" sz="2400" b="0" i="1" smtClean="0">
-                                  <a:latin typeface="Cambria Math" panose="02040503050406030204" pitchFamily="18" charset="0"/>
-                                  <a:ea typeface="Cambria Math" panose="02040503050406030204" pitchFamily="18" charset="0"/>
-                                </a:rPr>
-                                <m:t>𝜂</m:t>
-                              </m:r>
-                            </m:e>
-                            <m:sub>
-                              <m:r>
-                                <a:rPr lang="en-US" sz="2400" b="0" i="1" smtClean="0">
-                                  <a:latin typeface="Cambria Math" panose="02040503050406030204" pitchFamily="18" charset="0"/>
-                                </a:rPr>
-                                <m:t>𝑡</m:t>
-                              </m:r>
-                            </m:sub>
-                          </m:sSub>
-                        </m:e>
-                      </m:d>
-                    </m:oMath>
-                  </m:oMathPara>
-                </a14:m>
-                <a:endParaRPr lang="en-US" sz="2400" i="1" dirty="0"/>
-              </a:p>
-            </p:txBody>
-          </p:sp>
-        </mc:Choice>
-        <mc:Fallback>
-          <p:sp>
-            <p:nvSpPr>
-              <p:cNvPr id="15" name="Rounded Rectangle 14">
-                <a:extLst>
-                  <a:ext uri="{FF2B5EF4-FFF2-40B4-BE49-F238E27FC236}">
-                    <a16:creationId xmlns:a16="http://schemas.microsoft.com/office/drawing/2014/main" id="{484AB6B6-EBA3-9649-8407-BEDE06BB3C00}"/>
-                  </a:ext>
-                </a:extLst>
-              </p:cNvPr>
-              <p:cNvSpPr>
-                <a:spLocks noRot="1" noChangeAspect="1" noMove="1" noResize="1" noEditPoints="1" noAdjustHandles="1" noChangeArrowheads="1" noChangeShapeType="1" noTextEdit="1"/>
-              </p:cNvSpPr>
-              <p:nvPr/>
-            </p:nvSpPr>
-            <p:spPr>
-              <a:xfrm>
-                <a:off x="4247970" y="4041465"/>
-                <a:ext cx="2033559" cy="540474"/>
-              </a:xfrm>
-              <a:prstGeom prst="roundRect">
-                <a:avLst/>
-              </a:prstGeom>
-              <a:blipFill>
-                <a:blip r:embed="rId11"/>
-                <a:stretch>
-                  <a:fillRect b="-9091"/>
-                </a:stretch>
-              </a:blipFill>
-            </p:spPr>
-            <p:txBody>
-              <a:bodyPr/>
-              <a:lstStyle/>
-              <a:p>
-                <a:r>
-                  <a:rPr lang="en-US">
-                    <a:noFill/>
-                  </a:rPr>
-                  <a:t> </a:t>
-                </a:r>
-              </a:p>
-            </p:txBody>
-          </p:sp>
-        </mc:Fallback>
-      </mc:AlternateContent>
-      <mc:AlternateContent xmlns:mc="http://schemas.openxmlformats.org/markup-compatibility/2006">
-        <mc:Choice xmlns:a14="http://schemas.microsoft.com/office/drawing/2010/main" Requires="a14">
-          <p:sp>
-            <p:nvSpPr>
-              <p:cNvPr id="16" name="Rounded Rectangle 15">
-                <a:extLst>
-                  <a:ext uri="{FF2B5EF4-FFF2-40B4-BE49-F238E27FC236}">
-                    <a16:creationId xmlns:a16="http://schemas.microsoft.com/office/drawing/2014/main" id="{E00102CB-BD62-1C45-B707-F287112F8AB6}"/>
-                  </a:ext>
-                </a:extLst>
-              </p:cNvPr>
-              <p:cNvSpPr/>
-              <p:nvPr/>
-            </p:nvSpPr>
-            <p:spPr>
-              <a:xfrm>
-                <a:off x="2594435" y="5027769"/>
-                <a:ext cx="1161145" cy="1332526"/>
-              </a:xfrm>
-              <a:prstGeom prst="roundRect">
-                <a:avLst/>
-              </a:prstGeom>
-            </p:spPr>
-            <p:style>
-              <a:lnRef idx="1">
-                <a:schemeClr val="accent3"/>
-              </a:lnRef>
-              <a:fillRef idx="2">
-                <a:schemeClr val="accent3"/>
-              </a:fillRef>
-              <a:effectRef idx="1">
-                <a:schemeClr val="accent3"/>
-              </a:effectRef>
-              <a:fontRef idx="minor">
-                <a:schemeClr val="dk1"/>
-              </a:fontRef>
-            </p:style>
-            <p:txBody>
-              <a:bodyPr rtlCol="0" anchor="ctr"/>
-              <a:lstStyle/>
-              <a:p>
-                <a:pPr algn="ctr"/>
-                <a14:m>
-                  <m:oMathPara xmlns:m="http://schemas.openxmlformats.org/officeDocument/2006/math">
-                    <m:oMathParaPr>
-                      <m:jc m:val="centerGroup"/>
-                    </m:oMathParaPr>
-                    <m:oMath xmlns:m="http://schemas.openxmlformats.org/officeDocument/2006/math">
-                      <m:m>
-                        <m:mPr>
-                          <m:mcs>
-                            <m:mc>
-                              <m:mcPr>
-                                <m:count m:val="1"/>
-                                <m:mcJc m:val="center"/>
-                              </m:mcPr>
-                            </m:mc>
-                          </m:mcs>
-                          <m:ctrlPr>
-                            <a:rPr lang="en-US" sz="2400" i="1" smtClean="0">
-                              <a:latin typeface="Cambria Math" panose="02040503050406030204" pitchFamily="18" charset="0"/>
-                            </a:rPr>
-                          </m:ctrlPr>
-                        </m:mPr>
-                        <m:mr>
-                          <m:e>
-                            <m:sSub>
-                              <m:sSubPr>
-                                <m:ctrlPr>
-                                  <a:rPr lang="en-US" sz="2400" i="1">
-                                    <a:latin typeface="Cambria Math" panose="02040503050406030204" pitchFamily="18" charset="0"/>
-                                  </a:rPr>
-                                </m:ctrlPr>
-                              </m:sSubPr>
-                              <m:e>
-                                <m:r>
-                                  <a:rPr lang="en-US" sz="2400" b="0" i="1" smtClean="0">
-                                    <a:latin typeface="Cambria Math" panose="02040503050406030204" pitchFamily="18" charset="0"/>
-                                    <a:ea typeface="Cambria Math" panose="02040503050406030204" pitchFamily="18" charset="0"/>
-                                  </a:rPr>
-                                  <m:t>𝑋</m:t>
-                                </m:r>
-                              </m:e>
-                              <m:sub>
-                                <m:r>
-                                  <a:rPr lang="en-US" sz="2400" i="1">
-                                    <a:latin typeface="Cambria Math" panose="02040503050406030204" pitchFamily="18" charset="0"/>
-                                  </a:rPr>
-                                  <m:t>𝑤</m:t>
-                                </m:r>
-                                <m:r>
-                                  <a:rPr lang="en-US" sz="2400" i="1">
-                                    <a:latin typeface="Cambria Math" panose="02040503050406030204" pitchFamily="18" charset="0"/>
-                                  </a:rPr>
-                                  <m:t>,</m:t>
-                                </m:r>
-                                <m:r>
-                                  <a:rPr lang="en-US" sz="2400" i="1">
-                                    <a:latin typeface="Cambria Math" panose="02040503050406030204" pitchFamily="18" charset="0"/>
-                                  </a:rPr>
-                                  <m:t>𝑡</m:t>
-                                </m:r>
-                              </m:sub>
-                            </m:sSub>
-                          </m:e>
-                        </m:mr>
-                        <m:mr>
-                          <m:e>
-                            <m:sSub>
-                              <m:sSubPr>
-                                <m:ctrlPr>
-                                  <a:rPr lang="en-US" sz="2400" i="1">
-                                    <a:latin typeface="Cambria Math" panose="02040503050406030204" pitchFamily="18" charset="0"/>
-                                  </a:rPr>
-                                </m:ctrlPr>
-                              </m:sSubPr>
-                              <m:e>
-                                <m:r>
-                                  <a:rPr lang="en-US" sz="2400" b="0" i="1" smtClean="0">
-                                    <a:latin typeface="Cambria Math" panose="02040503050406030204" pitchFamily="18" charset="0"/>
-                                    <a:ea typeface="Cambria Math" panose="02040503050406030204" pitchFamily="18" charset="0"/>
-                                  </a:rPr>
-                                  <m:t>𝑋</m:t>
-                                </m:r>
-                              </m:e>
-                              <m:sub>
-                                <m:r>
-                                  <a:rPr lang="en-US" sz="2400" i="1">
-                                    <a:latin typeface="Cambria Math" panose="02040503050406030204" pitchFamily="18" charset="0"/>
-                                  </a:rPr>
-                                  <m:t>h𝑐</m:t>
-                                </m:r>
-                                <m:r>
-                                  <a:rPr lang="en-US" sz="2400" i="1">
-                                    <a:latin typeface="Cambria Math" panose="02040503050406030204" pitchFamily="18" charset="0"/>
-                                  </a:rPr>
-                                  <m:t>,</m:t>
-                                </m:r>
-                                <m:r>
-                                  <a:rPr lang="en-US" sz="2400" i="1">
-                                    <a:latin typeface="Cambria Math" panose="02040503050406030204" pitchFamily="18" charset="0"/>
-                                  </a:rPr>
-                                  <m:t>𝑡</m:t>
-                                </m:r>
-                              </m:sub>
-                            </m:sSub>
-                          </m:e>
-                        </m:mr>
-                        <m:mr>
-                          <m:e>
-                            <m:sSub>
-                              <m:sSubPr>
-                                <m:ctrlPr>
-                                  <a:rPr lang="en-US" sz="2400" i="1">
-                                    <a:latin typeface="Cambria Math" panose="02040503050406030204" pitchFamily="18" charset="0"/>
-                                  </a:rPr>
-                                </m:ctrlPr>
-                              </m:sSubPr>
-                              <m:e>
-                                <m:r>
-                                  <a:rPr lang="en-US" sz="2400" b="0" i="1" smtClean="0">
-                                    <a:latin typeface="Cambria Math" panose="02040503050406030204" pitchFamily="18" charset="0"/>
-                                    <a:ea typeface="Cambria Math" panose="02040503050406030204" pitchFamily="18" charset="0"/>
-                                  </a:rPr>
-                                  <m:t>𝑋</m:t>
-                                </m:r>
-                              </m:e>
-                              <m:sub>
-                                <m:r>
-                                  <a:rPr lang="en-US" sz="2400" i="1">
-                                    <a:latin typeface="Cambria Math" panose="02040503050406030204" pitchFamily="18" charset="0"/>
-                                  </a:rPr>
-                                  <m:t>h𝑛𝑐</m:t>
-                                </m:r>
-                                <m:r>
-                                  <a:rPr lang="en-US" sz="2400" i="1">
-                                    <a:latin typeface="Cambria Math" panose="02040503050406030204" pitchFamily="18" charset="0"/>
-                                  </a:rPr>
-                                  <m:t>,</m:t>
-                                </m:r>
-                                <m:r>
-                                  <a:rPr lang="en-US" sz="2400" i="1">
-                                    <a:latin typeface="Cambria Math" panose="02040503050406030204" pitchFamily="18" charset="0"/>
-                                  </a:rPr>
-                                  <m:t>𝑡</m:t>
-                                </m:r>
-                              </m:sub>
-                            </m:sSub>
-                          </m:e>
-                        </m:mr>
-                      </m:m>
-                    </m:oMath>
-                  </m:oMathPara>
-                </a14:m>
-                <a:endParaRPr lang="en-US" sz="2400" dirty="0"/>
-              </a:p>
-            </p:txBody>
-          </p:sp>
-        </mc:Choice>
-        <mc:Fallback>
-          <p:sp>
-            <p:nvSpPr>
-              <p:cNvPr id="16" name="Rounded Rectangle 15">
-                <a:extLst>
-                  <a:ext uri="{FF2B5EF4-FFF2-40B4-BE49-F238E27FC236}">
-                    <a16:creationId xmlns:a16="http://schemas.microsoft.com/office/drawing/2014/main" id="{E00102CB-BD62-1C45-B707-F287112F8AB6}"/>
-                  </a:ext>
-                </a:extLst>
-              </p:cNvPr>
-              <p:cNvSpPr>
-                <a:spLocks noRot="1" noChangeAspect="1" noMove="1" noResize="1" noEditPoints="1" noAdjustHandles="1" noChangeArrowheads="1" noChangeShapeType="1" noTextEdit="1"/>
-              </p:cNvSpPr>
-              <p:nvPr/>
-            </p:nvSpPr>
-            <p:spPr>
-              <a:xfrm>
-                <a:off x="2594435" y="5027769"/>
-                <a:ext cx="1161145" cy="1332526"/>
-              </a:xfrm>
-              <a:prstGeom prst="roundRect">
-                <a:avLst/>
-              </a:prstGeom>
-              <a:blipFill>
-                <a:blip r:embed="rId12"/>
-                <a:stretch>
-                  <a:fillRect/>
-                </a:stretch>
-              </a:blipFill>
-            </p:spPr>
-            <p:txBody>
-              <a:bodyPr/>
-              <a:lstStyle/>
-              <a:p>
-                <a:r>
-                  <a:rPr lang="en-US">
-                    <a:noFill/>
-                  </a:rPr>
-                  <a:t> </a:t>
-                </a:r>
-              </a:p>
-            </p:txBody>
-          </p:sp>
-        </mc:Fallback>
-      </mc:AlternateContent>
-      <p:cxnSp>
-        <p:nvCxnSpPr>
-          <p:cNvPr id="81" name="Curved Connector 80">
-            <a:extLst>
-              <a:ext uri="{FF2B5EF4-FFF2-40B4-BE49-F238E27FC236}">
-                <a16:creationId xmlns:a16="http://schemas.microsoft.com/office/drawing/2014/main" id="{3AC3B483-B501-0646-87E7-5C26646CCAC7}"/>
-              </a:ext>
-            </a:extLst>
-          </p:cNvPr>
-          <p:cNvCxnSpPr>
-            <a:stCxn id="7" idx="2"/>
-            <a:endCxn id="12" idx="3"/>
-          </p:cNvCxnSpPr>
-          <p:nvPr/>
-        </p:nvCxnSpPr>
-        <p:spPr>
-          <a:xfrm rot="5400000">
-            <a:off x="4144381" y="760503"/>
-            <a:ext cx="1973801" cy="2862420"/>
-          </a:xfrm>
-          <a:prstGeom prst="curvedConnector2">
-            <a:avLst/>
-          </a:prstGeom>
-          <a:ln w="12700">
-            <a:tailEnd type="triangle" w="lg" len="med"/>
-          </a:ln>
-        </p:spPr>
-        <p:style>
-          <a:lnRef idx="1">
-            <a:schemeClr val="dk1"/>
-          </a:lnRef>
-          <a:fillRef idx="0">
-            <a:schemeClr val="dk1"/>
-          </a:fillRef>
-          <a:effectRef idx="0">
-            <a:schemeClr val="dk1"/>
-          </a:effectRef>
-          <a:fontRef idx="minor">
-            <a:schemeClr val="tx1"/>
-          </a:fontRef>
-        </p:style>
-      </p:cxnSp>
-      <p:cxnSp>
-        <p:nvCxnSpPr>
-          <p:cNvPr id="82" name="Curved Connector 81">
-            <a:extLst>
-              <a:ext uri="{FF2B5EF4-FFF2-40B4-BE49-F238E27FC236}">
-                <a16:creationId xmlns:a16="http://schemas.microsoft.com/office/drawing/2014/main" id="{87AE347D-617E-C242-9B2C-CF4CB412361B}"/>
-              </a:ext>
-            </a:extLst>
-          </p:cNvPr>
-          <p:cNvCxnSpPr>
-            <a:cxnSpLocks/>
-            <a:stCxn id="25" idx="2"/>
-            <a:endCxn id="12" idx="3"/>
-          </p:cNvCxnSpPr>
-          <p:nvPr/>
-        </p:nvCxnSpPr>
-        <p:spPr>
-          <a:xfrm rot="5400000">
-            <a:off x="3732451" y="2398611"/>
-            <a:ext cx="747624" cy="812383"/>
-          </a:xfrm>
-          <a:prstGeom prst="curvedConnector2">
-            <a:avLst/>
-          </a:prstGeom>
-          <a:ln w="12700">
-            <a:tailEnd type="triangle" w="lg" len="med"/>
-          </a:ln>
-        </p:spPr>
-        <p:style>
-          <a:lnRef idx="1">
-            <a:schemeClr val="dk1"/>
-          </a:lnRef>
-          <a:fillRef idx="0">
-            <a:schemeClr val="dk1"/>
-          </a:fillRef>
-          <a:effectRef idx="0">
-            <a:schemeClr val="dk1"/>
-          </a:effectRef>
-          <a:fontRef idx="minor">
-            <a:schemeClr val="tx1"/>
-          </a:fontRef>
-        </p:style>
-      </p:cxnSp>
-      <p:cxnSp>
-        <p:nvCxnSpPr>
-          <p:cNvPr id="85" name="Curved Connector 84">
-            <a:extLst>
-              <a:ext uri="{FF2B5EF4-FFF2-40B4-BE49-F238E27FC236}">
-                <a16:creationId xmlns:a16="http://schemas.microsoft.com/office/drawing/2014/main" id="{5490071E-A4DB-554F-AB5B-A48A6D917188}"/>
-              </a:ext>
-            </a:extLst>
-          </p:cNvPr>
-          <p:cNvCxnSpPr>
-            <a:cxnSpLocks/>
-            <a:stCxn id="11" idx="2"/>
-            <a:endCxn id="12" idx="1"/>
-          </p:cNvCxnSpPr>
-          <p:nvPr/>
-        </p:nvCxnSpPr>
-        <p:spPr>
-          <a:xfrm rot="16200000" flipH="1">
-            <a:off x="1767995" y="2407681"/>
-            <a:ext cx="814727" cy="727137"/>
-          </a:xfrm>
-          <a:prstGeom prst="curvedConnector2">
-            <a:avLst/>
-          </a:prstGeom>
-          <a:ln w="12700">
-            <a:tailEnd type="triangle" w="lg" len="med"/>
-          </a:ln>
-        </p:spPr>
-        <p:style>
-          <a:lnRef idx="1">
-            <a:schemeClr val="dk1"/>
-          </a:lnRef>
-          <a:fillRef idx="0">
-            <a:schemeClr val="dk1"/>
-          </a:fillRef>
-          <a:effectRef idx="0">
-            <a:schemeClr val="dk1"/>
-          </a:effectRef>
-          <a:fontRef idx="minor">
-            <a:schemeClr val="tx1"/>
-          </a:fontRef>
-        </p:style>
-      </p:cxnSp>
-      <p:cxnSp>
-        <p:nvCxnSpPr>
-          <p:cNvPr id="88" name="Curved Connector 87">
-            <a:extLst>
-              <a:ext uri="{FF2B5EF4-FFF2-40B4-BE49-F238E27FC236}">
-                <a16:creationId xmlns:a16="http://schemas.microsoft.com/office/drawing/2014/main" id="{3D964BBC-978F-3445-A0F8-238B88BB3393}"/>
-              </a:ext>
-            </a:extLst>
-          </p:cNvPr>
-          <p:cNvCxnSpPr>
-            <a:cxnSpLocks/>
-            <a:stCxn id="9" idx="2"/>
-            <a:endCxn id="12" idx="1"/>
-          </p:cNvCxnSpPr>
-          <p:nvPr/>
-        </p:nvCxnSpPr>
-        <p:spPr>
-          <a:xfrm rot="16200000" flipH="1">
-            <a:off x="740611" y="1380298"/>
-            <a:ext cx="2014646" cy="1581985"/>
-          </a:xfrm>
-          <a:prstGeom prst="curvedConnector2">
-            <a:avLst/>
-          </a:prstGeom>
-          <a:ln w="12700">
-            <a:tailEnd type="triangle" w="lg" len="med"/>
-          </a:ln>
-        </p:spPr>
-        <p:style>
-          <a:lnRef idx="1">
-            <a:schemeClr val="dk1"/>
-          </a:lnRef>
-          <a:fillRef idx="0">
-            <a:schemeClr val="dk1"/>
-          </a:fillRef>
-          <a:effectRef idx="0">
-            <a:schemeClr val="dk1"/>
-          </a:effectRef>
-          <a:fontRef idx="minor">
-            <a:schemeClr val="tx1"/>
-          </a:fontRef>
-        </p:style>
-      </p:cxnSp>
-      <p:cxnSp>
-        <p:nvCxnSpPr>
-          <p:cNvPr id="91" name="Straight Arrow Connector 90">
-            <a:extLst>
-              <a:ext uri="{FF2B5EF4-FFF2-40B4-BE49-F238E27FC236}">
-                <a16:creationId xmlns:a16="http://schemas.microsoft.com/office/drawing/2014/main" id="{31778B8A-ED9C-1144-9163-B1C6F3F11E62}"/>
-              </a:ext>
-            </a:extLst>
-          </p:cNvPr>
-          <p:cNvCxnSpPr>
-            <a:cxnSpLocks/>
-            <a:stCxn id="9" idx="2"/>
-            <a:endCxn id="14" idx="0"/>
-          </p:cNvCxnSpPr>
-          <p:nvPr/>
-        </p:nvCxnSpPr>
-        <p:spPr>
-          <a:xfrm>
-            <a:off x="956942" y="1163968"/>
-            <a:ext cx="71056" cy="2532445"/>
-          </a:xfrm>
-          <a:prstGeom prst="straightConnector1">
-            <a:avLst/>
-          </a:prstGeom>
-          <a:ln w="12700">
-            <a:tailEnd type="triangle" w="lg" len="med"/>
-          </a:ln>
-        </p:spPr>
-        <p:style>
-          <a:lnRef idx="1">
-            <a:schemeClr val="dk1"/>
-          </a:lnRef>
-          <a:fillRef idx="0">
-            <a:schemeClr val="dk1"/>
-          </a:fillRef>
-          <a:effectRef idx="0">
-            <a:schemeClr val="dk1"/>
-          </a:effectRef>
-          <a:fontRef idx="minor">
-            <a:schemeClr val="tx1"/>
-          </a:fontRef>
-        </p:style>
-      </p:cxnSp>
-      <p:cxnSp>
-        <p:nvCxnSpPr>
-          <p:cNvPr id="94" name="Curved Connector 93">
-            <a:extLst>
-              <a:ext uri="{FF2B5EF4-FFF2-40B4-BE49-F238E27FC236}">
-                <a16:creationId xmlns:a16="http://schemas.microsoft.com/office/drawing/2014/main" id="{EA9AF001-2E93-F945-A9C1-A42413C1E0C5}"/>
-              </a:ext>
-            </a:extLst>
-          </p:cNvPr>
-          <p:cNvCxnSpPr>
-            <a:cxnSpLocks/>
-            <a:stCxn id="56" idx="3"/>
-            <a:endCxn id="13" idx="0"/>
-          </p:cNvCxnSpPr>
-          <p:nvPr/>
-        </p:nvCxnSpPr>
-        <p:spPr>
-          <a:xfrm>
-            <a:off x="4165022" y="796772"/>
-            <a:ext cx="2131189" cy="1799341"/>
-          </a:xfrm>
-          <a:prstGeom prst="curvedConnector2">
-            <a:avLst/>
-          </a:prstGeom>
-          <a:ln w="12700">
-            <a:tailEnd type="triangle" w="lg" len="med"/>
-          </a:ln>
-        </p:spPr>
-        <p:style>
-          <a:lnRef idx="1">
-            <a:schemeClr val="dk1"/>
-          </a:lnRef>
-          <a:fillRef idx="0">
-            <a:schemeClr val="dk1"/>
-          </a:fillRef>
-          <a:effectRef idx="0">
-            <a:schemeClr val="dk1"/>
-          </a:effectRef>
-          <a:fontRef idx="minor">
-            <a:schemeClr val="tx1"/>
-          </a:fontRef>
-        </p:style>
-      </p:cxnSp>
-      <p:cxnSp>
-        <p:nvCxnSpPr>
-          <p:cNvPr id="97" name="Curved Connector 96">
-            <a:extLst>
-              <a:ext uri="{FF2B5EF4-FFF2-40B4-BE49-F238E27FC236}">
-                <a16:creationId xmlns:a16="http://schemas.microsoft.com/office/drawing/2014/main" id="{78438621-F564-094D-9D87-D78BF8BFBA15}"/>
-              </a:ext>
-            </a:extLst>
-          </p:cNvPr>
-          <p:cNvCxnSpPr>
-            <a:cxnSpLocks/>
-            <a:stCxn id="13" idx="1"/>
-            <a:endCxn id="15" idx="0"/>
-          </p:cNvCxnSpPr>
-          <p:nvPr/>
-        </p:nvCxnSpPr>
-        <p:spPr>
-          <a:xfrm rot="10800000" flipV="1">
-            <a:off x="5264751" y="2998821"/>
-            <a:ext cx="692779" cy="1042644"/>
-          </a:xfrm>
-          <a:prstGeom prst="curvedConnector2">
-            <a:avLst/>
-          </a:prstGeom>
-          <a:ln w="12700">
-            <a:tailEnd type="triangle" w="lg" len="med"/>
-          </a:ln>
-        </p:spPr>
-        <p:style>
-          <a:lnRef idx="1">
-            <a:schemeClr val="dk1"/>
-          </a:lnRef>
-          <a:fillRef idx="0">
-            <a:schemeClr val="dk1"/>
-          </a:fillRef>
-          <a:effectRef idx="0">
-            <a:schemeClr val="dk1"/>
-          </a:effectRef>
-          <a:fontRef idx="minor">
-            <a:schemeClr val="tx1"/>
-          </a:fontRef>
-        </p:style>
-      </p:cxnSp>
-      <p:cxnSp>
-        <p:nvCxnSpPr>
-          <p:cNvPr id="100" name="Curved Connector 99">
-            <a:extLst>
-              <a:ext uri="{FF2B5EF4-FFF2-40B4-BE49-F238E27FC236}">
-                <a16:creationId xmlns:a16="http://schemas.microsoft.com/office/drawing/2014/main" id="{1EE7A001-E6C4-2E4B-B235-56548B57B558}"/>
-              </a:ext>
-            </a:extLst>
-          </p:cNvPr>
-          <p:cNvCxnSpPr>
-            <a:cxnSpLocks/>
-            <a:stCxn id="15" idx="1"/>
-            <a:endCxn id="16" idx="0"/>
-          </p:cNvCxnSpPr>
-          <p:nvPr/>
-        </p:nvCxnSpPr>
-        <p:spPr>
-          <a:xfrm rot="10800000" flipV="1">
-            <a:off x="3175008" y="4311701"/>
-            <a:ext cx="1072962" cy="716067"/>
-          </a:xfrm>
-          <a:prstGeom prst="curvedConnector2">
-            <a:avLst/>
-          </a:prstGeom>
-          <a:ln w="12700">
-            <a:tailEnd type="triangle" w="lg" len="med"/>
-          </a:ln>
-        </p:spPr>
-        <p:style>
-          <a:lnRef idx="1">
-            <a:schemeClr val="dk1"/>
-          </a:lnRef>
-          <a:fillRef idx="0">
-            <a:schemeClr val="dk1"/>
-          </a:fillRef>
-          <a:effectRef idx="0">
-            <a:schemeClr val="dk1"/>
-          </a:effectRef>
-          <a:fontRef idx="minor">
-            <a:schemeClr val="tx1"/>
-          </a:fontRef>
-        </p:style>
-      </p:cxnSp>
-      <p:cxnSp>
-        <p:nvCxnSpPr>
-          <p:cNvPr id="105" name="Curved Connector 104">
-            <a:extLst>
-              <a:ext uri="{FF2B5EF4-FFF2-40B4-BE49-F238E27FC236}">
-                <a16:creationId xmlns:a16="http://schemas.microsoft.com/office/drawing/2014/main" id="{A61C8F04-8EC4-E248-8EC8-9FFBB25010D2}"/>
-              </a:ext>
-            </a:extLst>
-          </p:cNvPr>
-          <p:cNvCxnSpPr>
-            <a:cxnSpLocks/>
-            <a:stCxn id="12" idx="2"/>
-            <a:endCxn id="15" idx="0"/>
-          </p:cNvCxnSpPr>
-          <p:nvPr/>
-        </p:nvCxnSpPr>
-        <p:spPr>
-          <a:xfrm rot="16200000" flipH="1">
-            <a:off x="3962053" y="2738767"/>
-            <a:ext cx="460143" cy="2145251"/>
-          </a:xfrm>
-          <a:prstGeom prst="curvedConnector3">
-            <a:avLst>
-              <a:gd name="adj1" fmla="val 50000"/>
-            </a:avLst>
-          </a:prstGeom>
-          <a:ln w="12700">
-            <a:tailEnd type="triangle" w="lg" len="med"/>
-          </a:ln>
-        </p:spPr>
-        <p:style>
-          <a:lnRef idx="1">
-            <a:schemeClr val="dk1"/>
-          </a:lnRef>
-          <a:fillRef idx="0">
-            <a:schemeClr val="dk1"/>
-          </a:fillRef>
-          <a:effectRef idx="0">
-            <a:schemeClr val="dk1"/>
-          </a:effectRef>
-          <a:fontRef idx="minor">
-            <a:schemeClr val="tx1"/>
-          </a:fontRef>
-        </p:style>
-      </p:cxnSp>
-      <p:cxnSp>
-        <p:nvCxnSpPr>
-          <p:cNvPr id="111" name="Curved Connector 110">
-            <a:extLst>
-              <a:ext uri="{FF2B5EF4-FFF2-40B4-BE49-F238E27FC236}">
-                <a16:creationId xmlns:a16="http://schemas.microsoft.com/office/drawing/2014/main" id="{A55F1B87-986E-BE40-A4C4-13DF22E1473D}"/>
-              </a:ext>
-            </a:extLst>
-          </p:cNvPr>
-          <p:cNvCxnSpPr>
-            <a:cxnSpLocks/>
-            <a:stCxn id="14" idx="3"/>
-            <a:endCxn id="16" idx="0"/>
-          </p:cNvCxnSpPr>
-          <p:nvPr/>
-        </p:nvCxnSpPr>
-        <p:spPr>
-          <a:xfrm>
-            <a:off x="1665480" y="4271647"/>
-            <a:ext cx="1509528" cy="756122"/>
-          </a:xfrm>
-          <a:prstGeom prst="curvedConnector2">
-            <a:avLst/>
-          </a:prstGeom>
-          <a:ln w="12700">
-            <a:tailEnd type="triangle" w="lg" len="med"/>
-          </a:ln>
-        </p:spPr>
-        <p:style>
-          <a:lnRef idx="1">
-            <a:schemeClr val="dk1"/>
-          </a:lnRef>
-          <a:fillRef idx="0">
-            <a:schemeClr val="dk1"/>
-          </a:fillRef>
-          <a:effectRef idx="0">
-            <a:schemeClr val="dk1"/>
-          </a:effectRef>
-          <a:fontRef idx="minor">
-            <a:schemeClr val="tx1"/>
-          </a:fontRef>
-        </p:style>
-      </p:cxnSp>
-      <p:cxnSp>
-        <p:nvCxnSpPr>
-          <p:cNvPr id="114" name="Curved Connector 113">
-            <a:extLst>
-              <a:ext uri="{FF2B5EF4-FFF2-40B4-BE49-F238E27FC236}">
-                <a16:creationId xmlns:a16="http://schemas.microsoft.com/office/drawing/2014/main" id="{E2873F3D-D9FE-1043-9EBF-234756EB2355}"/>
-              </a:ext>
-            </a:extLst>
-          </p:cNvPr>
-          <p:cNvCxnSpPr>
-            <a:cxnSpLocks/>
-            <a:stCxn id="56" idx="2"/>
-            <a:endCxn id="25" idx="0"/>
-          </p:cNvCxnSpPr>
-          <p:nvPr/>
-        </p:nvCxnSpPr>
-        <p:spPr>
-          <a:xfrm rot="16200000" flipH="1">
-            <a:off x="3884465" y="997585"/>
-            <a:ext cx="426094" cy="829884"/>
-          </a:xfrm>
-          <a:prstGeom prst="curvedConnector3">
-            <a:avLst>
-              <a:gd name="adj1" fmla="val 50000"/>
-            </a:avLst>
-          </a:prstGeom>
-          <a:ln w="12700">
-            <a:tailEnd type="triangle" w="lg" len="med"/>
-          </a:ln>
-        </p:spPr>
-        <p:style>
-          <a:lnRef idx="1">
-            <a:schemeClr val="dk1"/>
-          </a:lnRef>
-          <a:fillRef idx="0">
-            <a:schemeClr val="dk1"/>
-          </a:fillRef>
-          <a:effectRef idx="0">
-            <a:schemeClr val="dk1"/>
-          </a:effectRef>
-          <a:fontRef idx="minor">
-            <a:schemeClr val="tx1"/>
-          </a:fontRef>
-        </p:style>
-      </p:cxnSp>
-      <p:cxnSp>
-        <p:nvCxnSpPr>
-          <p:cNvPr id="117" name="Curved Connector 116">
-            <a:extLst>
-              <a:ext uri="{FF2B5EF4-FFF2-40B4-BE49-F238E27FC236}">
-                <a16:creationId xmlns:a16="http://schemas.microsoft.com/office/drawing/2014/main" id="{395AB83C-EB83-F643-B1FD-ECE0D096B6DE}"/>
-              </a:ext>
-            </a:extLst>
-          </p:cNvPr>
-          <p:cNvCxnSpPr>
-            <a:cxnSpLocks/>
-            <a:stCxn id="8" idx="2"/>
-            <a:endCxn id="11" idx="0"/>
-          </p:cNvCxnSpPr>
-          <p:nvPr/>
-        </p:nvCxnSpPr>
-        <p:spPr>
-          <a:xfrm rot="5400000">
-            <a:off x="2064177" y="953317"/>
-            <a:ext cx="352767" cy="857540"/>
-          </a:xfrm>
-          <a:prstGeom prst="curvedConnector3">
-            <a:avLst>
-              <a:gd name="adj1" fmla="val 50000"/>
-            </a:avLst>
-          </a:prstGeom>
-          <a:ln w="12700">
-            <a:tailEnd type="triangle" w="lg" len="med"/>
-          </a:ln>
-        </p:spPr>
-        <p:style>
-          <a:lnRef idx="1">
-            <a:schemeClr val="dk1"/>
-          </a:lnRef>
-          <a:fillRef idx="0">
-            <a:schemeClr val="dk1"/>
-          </a:fillRef>
-          <a:effectRef idx="0">
-            <a:schemeClr val="dk1"/>
-          </a:effectRef>
-          <a:fontRef idx="minor">
-            <a:schemeClr val="tx1"/>
-          </a:fontRef>
-        </p:style>
-      </p:cxnSp>
-      <p:cxnSp>
-        <p:nvCxnSpPr>
-          <p:cNvPr id="120" name="Curved Connector 119">
-            <a:extLst>
-              <a:ext uri="{FF2B5EF4-FFF2-40B4-BE49-F238E27FC236}">
-                <a16:creationId xmlns:a16="http://schemas.microsoft.com/office/drawing/2014/main" id="{6BEE2A96-2B19-2E45-B108-4DF58879FC6E}"/>
-              </a:ext>
-            </a:extLst>
-          </p:cNvPr>
-          <p:cNvCxnSpPr>
-            <a:cxnSpLocks/>
-            <a:stCxn id="9" idx="2"/>
-            <a:endCxn id="11" idx="0"/>
-          </p:cNvCxnSpPr>
-          <p:nvPr/>
-        </p:nvCxnSpPr>
-        <p:spPr>
-          <a:xfrm rot="16200000" flipH="1">
-            <a:off x="1187115" y="933795"/>
-            <a:ext cx="394503" cy="854848"/>
-          </a:xfrm>
-          <a:prstGeom prst="curvedConnector3">
-            <a:avLst>
-              <a:gd name="adj1" fmla="val 50000"/>
-            </a:avLst>
-          </a:prstGeom>
-          <a:ln w="12700">
-            <a:tailEnd type="triangle" w="lg" len="med"/>
-          </a:ln>
-        </p:spPr>
-        <p:style>
-          <a:lnRef idx="1">
-            <a:schemeClr val="dk1"/>
-          </a:lnRef>
-          <a:fillRef idx="0">
-            <a:schemeClr val="dk1"/>
-          </a:fillRef>
-          <a:effectRef idx="0">
-            <a:schemeClr val="dk1"/>
-          </a:effectRef>
-          <a:fontRef idx="minor">
-            <a:schemeClr val="tx1"/>
-          </a:fontRef>
-        </p:style>
-      </p:cxnSp>
-      <mc:AlternateContent xmlns:mc="http://schemas.openxmlformats.org/markup-compatibility/2006">
-        <mc:Choice xmlns:a14="http://schemas.microsoft.com/office/drawing/2010/main" Requires="a14">
-          <p:sp>
-            <p:nvSpPr>
-              <p:cNvPr id="25" name="Rounded Rectangle 24">
-                <a:extLst>
-                  <a:ext uri="{FF2B5EF4-FFF2-40B4-BE49-F238E27FC236}">
-                    <a16:creationId xmlns:a16="http://schemas.microsoft.com/office/drawing/2014/main" id="{F7BE042F-0CC8-C140-89E7-64DFBB646DC9}"/>
-                  </a:ext>
-                </a:extLst>
-              </p:cNvPr>
-              <p:cNvSpPr/>
-              <p:nvPr/>
-            </p:nvSpPr>
-            <p:spPr>
-              <a:xfrm>
-                <a:off x="4165021" y="1625574"/>
-                <a:ext cx="694866" cy="805416"/>
-              </a:xfrm>
-              <a:prstGeom prst="roundRect">
-                <a:avLst/>
-              </a:prstGeom>
-            </p:spPr>
-            <p:style>
-              <a:lnRef idx="2">
-                <a:schemeClr val="dk1">
-                  <a:shade val="50000"/>
-                </a:schemeClr>
-              </a:lnRef>
-              <a:fillRef idx="1">
-                <a:schemeClr val="dk1"/>
-              </a:fillRef>
-              <a:effectRef idx="0">
-                <a:schemeClr val="dk1"/>
-              </a:effectRef>
-              <a:fontRef idx="minor">
-                <a:schemeClr val="lt1"/>
-              </a:fontRef>
-            </p:style>
-            <p:txBody>
-              <a:bodyPr rtlCol="0" anchor="ctr"/>
-              <a:lstStyle/>
-              <a:p>
-                <a:pPr algn="ctr"/>
-                <a14:m>
-                  <m:oMathPara xmlns:m="http://schemas.openxmlformats.org/officeDocument/2006/math">
-                    <m:oMathParaPr>
-                      <m:jc m:val="centerGroup"/>
-                    </m:oMathParaPr>
-                    <m:oMath xmlns:m="http://schemas.openxmlformats.org/officeDocument/2006/math">
-                      <m:sSub>
-                        <m:sSubPr>
-                          <m:ctrlPr>
-                            <a:rPr lang="en-US" sz="2400" i="1" smtClean="0">
-                              <a:latin typeface="Cambria Math" panose="02040503050406030204" pitchFamily="18" charset="0"/>
-                            </a:rPr>
-                          </m:ctrlPr>
-                        </m:sSubPr>
-                        <m:e>
-                          <m:r>
-                            <a:rPr lang="en-US" sz="2400" i="1" smtClean="0">
-                              <a:latin typeface="Cambria Math" panose="02040503050406030204" pitchFamily="18" charset="0"/>
-                              <a:ea typeface="Cambria Math" panose="02040503050406030204" pitchFamily="18" charset="0"/>
-                            </a:rPr>
-                            <m:t>𝜃</m:t>
-                          </m:r>
-                        </m:e>
-                        <m:sub>
-                          <m:r>
-                            <a:rPr lang="en-US" sz="2400" b="0" i="1" smtClean="0">
-                              <a:latin typeface="Cambria Math" panose="02040503050406030204" pitchFamily="18" charset="0"/>
-                            </a:rPr>
-                            <m:t>𝑡</m:t>
-                          </m:r>
-                        </m:sub>
-                      </m:sSub>
-                    </m:oMath>
-                  </m:oMathPara>
-                </a14:m>
-                <a:endParaRPr lang="en-US" sz="2400" dirty="0"/>
-              </a:p>
-            </p:txBody>
-          </p:sp>
-        </mc:Choice>
-        <mc:Fallback>
-          <p:sp>
-            <p:nvSpPr>
-              <p:cNvPr id="25" name="Rounded Rectangle 24">
-                <a:extLst>
-                  <a:ext uri="{FF2B5EF4-FFF2-40B4-BE49-F238E27FC236}">
-                    <a16:creationId xmlns:a16="http://schemas.microsoft.com/office/drawing/2014/main" id="{F7BE042F-0CC8-C140-89E7-64DFBB646DC9}"/>
-                  </a:ext>
-                </a:extLst>
-              </p:cNvPr>
-              <p:cNvSpPr>
-                <a:spLocks noRot="1" noChangeAspect="1" noMove="1" noResize="1" noEditPoints="1" noAdjustHandles="1" noChangeArrowheads="1" noChangeShapeType="1" noTextEdit="1"/>
-              </p:cNvSpPr>
-              <p:nvPr/>
-            </p:nvSpPr>
-            <p:spPr>
-              <a:xfrm>
-                <a:off x="4165021" y="1625574"/>
-                <a:ext cx="694866" cy="805416"/>
-              </a:xfrm>
-              <a:prstGeom prst="roundRect">
-                <a:avLst/>
-              </a:prstGeom>
-              <a:blipFill>
-                <a:blip r:embed="rId13"/>
-                <a:stretch>
-                  <a:fillRect/>
-                </a:stretch>
-              </a:blipFill>
-            </p:spPr>
-            <p:txBody>
-              <a:bodyPr/>
-              <a:lstStyle/>
-              <a:p>
-                <a:r>
-                  <a:rPr lang="en-US">
-                    <a:noFill/>
-                  </a:rPr>
-                  <a:t> </a:t>
-                </a:r>
-              </a:p>
-            </p:txBody>
-          </p:sp>
-        </mc:Fallback>
-      </mc:AlternateContent>
-      <p:cxnSp>
-        <p:nvCxnSpPr>
-          <p:cNvPr id="30" name="Curved Connector 29">
-            <a:extLst>
-              <a:ext uri="{FF2B5EF4-FFF2-40B4-BE49-F238E27FC236}">
-                <a16:creationId xmlns:a16="http://schemas.microsoft.com/office/drawing/2014/main" id="{BEBA9200-8EE5-6B46-9FA8-4A984B9CED42}"/>
-              </a:ext>
-            </a:extLst>
-          </p:cNvPr>
-          <p:cNvCxnSpPr>
-            <a:cxnSpLocks/>
-            <a:stCxn id="10" idx="2"/>
-            <a:endCxn id="12" idx="3"/>
-          </p:cNvCxnSpPr>
-          <p:nvPr/>
-        </p:nvCxnSpPr>
-        <p:spPr>
-          <a:xfrm rot="5400000">
-            <a:off x="4109504" y="2019082"/>
-            <a:ext cx="750099" cy="1568964"/>
-          </a:xfrm>
-          <a:prstGeom prst="curvedConnector2">
-            <a:avLst/>
-          </a:prstGeom>
-          <a:ln w="12700">
-            <a:tailEnd type="triangle" w="lg" len="med"/>
-          </a:ln>
-        </p:spPr>
-        <p:style>
-          <a:lnRef idx="1">
-            <a:schemeClr val="dk1"/>
-          </a:lnRef>
-          <a:fillRef idx="0">
-            <a:schemeClr val="dk1"/>
-          </a:fillRef>
-          <a:effectRef idx="0">
-            <a:schemeClr val="dk1"/>
-          </a:effectRef>
-          <a:fontRef idx="minor">
-            <a:schemeClr val="tx1"/>
-          </a:fontRef>
-        </p:style>
-      </p:cxnSp>
-      <mc:AlternateContent xmlns:mc="http://schemas.openxmlformats.org/markup-compatibility/2006">
-        <mc:Choice xmlns:a14="http://schemas.microsoft.com/office/drawing/2010/main" Requires="a14">
-          <p:sp>
-            <p:nvSpPr>
-              <p:cNvPr id="56" name="Rounded Rectangle 55">
-                <a:extLst>
-                  <a:ext uri="{FF2B5EF4-FFF2-40B4-BE49-F238E27FC236}">
-                    <a16:creationId xmlns:a16="http://schemas.microsoft.com/office/drawing/2014/main" id="{A99DD881-D879-8640-AEFC-A335B29B91DE}"/>
-                  </a:ext>
-                </a:extLst>
-              </p:cNvPr>
-              <p:cNvSpPr/>
-              <p:nvPr/>
-            </p:nvSpPr>
-            <p:spPr>
-              <a:xfrm>
-                <a:off x="3200117" y="394064"/>
-                <a:ext cx="964905" cy="805416"/>
-              </a:xfrm>
-              <a:prstGeom prst="roundRect">
-                <a:avLst/>
-              </a:prstGeom>
-            </p:spPr>
-            <p:style>
-              <a:lnRef idx="2">
-                <a:schemeClr val="dk1"/>
-              </a:lnRef>
-              <a:fillRef idx="1">
-                <a:schemeClr val="lt1"/>
-              </a:fillRef>
-              <a:effectRef idx="0">
-                <a:schemeClr val="dk1"/>
-              </a:effectRef>
-              <a:fontRef idx="minor">
-                <a:schemeClr val="dk1"/>
-              </a:fontRef>
-            </p:style>
-            <p:txBody>
-              <a:bodyPr rtlCol="0" anchor="ctr"/>
-              <a:lstStyle/>
-              <a:p>
-                <a:pPr algn="ctr"/>
-                <a14:m>
-                  <m:oMath xmlns:m="http://schemas.openxmlformats.org/officeDocument/2006/math">
-                    <m:sSub>
-                      <m:sSubPr>
-                        <m:ctrlPr>
-                          <a:rPr lang="en-US" sz="2400" i="1">
-                            <a:latin typeface="Cambria Math" panose="02040503050406030204" pitchFamily="18" charset="0"/>
-                          </a:rPr>
-                        </m:ctrlPr>
-                      </m:sSubPr>
-                      <m:e>
-                        <m:r>
-                          <a:rPr lang="en-US" sz="2400" b="0" i="1" smtClean="0">
-                            <a:latin typeface="Cambria Math" panose="02040503050406030204" pitchFamily="18" charset="0"/>
-                          </a:rPr>
-                          <m:t>𝑁</m:t>
-                        </m:r>
-                      </m:e>
-                      <m:sub>
-                        <m:r>
-                          <a:rPr lang="en-US" sz="2400" i="1">
-                            <a:latin typeface="Cambria Math" panose="02040503050406030204" pitchFamily="18" charset="0"/>
-                          </a:rPr>
-                          <m:t>𝑡</m:t>
-                        </m:r>
-                      </m:sub>
-                    </m:sSub>
-                  </m:oMath>
-                </a14:m>
-                <a:r>
-                  <a:rPr lang="en-US" sz="2400" i="1" dirty="0"/>
-                  <a:t> </a:t>
-                </a:r>
-              </a:p>
-            </p:txBody>
-          </p:sp>
-        </mc:Choice>
-        <mc:Fallback>
-          <p:sp>
-            <p:nvSpPr>
-              <p:cNvPr id="56" name="Rounded Rectangle 55">
-                <a:extLst>
-                  <a:ext uri="{FF2B5EF4-FFF2-40B4-BE49-F238E27FC236}">
-                    <a16:creationId xmlns:a16="http://schemas.microsoft.com/office/drawing/2014/main" id="{A99DD881-D879-8640-AEFC-A335B29B91DE}"/>
-                  </a:ext>
-                </a:extLst>
-              </p:cNvPr>
-              <p:cNvSpPr>
-                <a:spLocks noRot="1" noChangeAspect="1" noMove="1" noResize="1" noEditPoints="1" noAdjustHandles="1" noChangeArrowheads="1" noChangeShapeType="1" noTextEdit="1"/>
-              </p:cNvSpPr>
-              <p:nvPr/>
-            </p:nvSpPr>
-            <p:spPr>
-              <a:xfrm>
-                <a:off x="3200117" y="394064"/>
-                <a:ext cx="964905" cy="805416"/>
-              </a:xfrm>
-              <a:prstGeom prst="roundRect">
-                <a:avLst/>
-              </a:prstGeom>
-              <a:blipFill>
-                <a:blip r:embed="rId14"/>
-                <a:stretch>
-                  <a:fillRect/>
-                </a:stretch>
-              </a:blipFill>
-            </p:spPr>
-            <p:txBody>
-              <a:bodyPr/>
-              <a:lstStyle/>
-              <a:p>
-                <a:r>
-                  <a:rPr lang="en-US">
-                    <a:noFill/>
-                  </a:rPr>
-                  <a:t> </a:t>
-                </a:r>
-              </a:p>
-            </p:txBody>
-          </p:sp>
-        </mc:Fallback>
-      </mc:AlternateContent>
-    </p:spTree>
-    <p:extLst>
-      <p:ext uri="{BB962C8B-B14F-4D97-AF65-F5344CB8AC3E}">
-        <p14:creationId xmlns:p14="http://schemas.microsoft.com/office/powerpoint/2010/main" val="935056637"/>
-      </p:ext>
-    </p:extLst>
-  </p:cSld>
-  <p:clrMapOvr>
-    <a:masterClrMapping/>
-  </p:clrMapOvr>
-</p:sld>
-</file>
-
-<file path=ppt/slides/slide3.xml><?xml version="1.0" encoding="utf-8"?>
-<p:sld xmlns:a="http://schemas.openxmlformats.org/drawingml/2006/main" xmlns:r="http://schemas.openxmlformats.org/officeDocument/2006/relationships" xmlns:p="http://schemas.openxmlformats.org/presentationml/2006/main">
-  <p:cSld>
-    <p:spTree>
-      <p:nvGrpSpPr>
-        <p:cNvPr id="1" name=""/>
-        <p:cNvGrpSpPr/>
-        <p:nvPr/>
-      </p:nvGrpSpPr>
-      <p:grpSpPr>
-        <a:xfrm>
-          <a:off x="0" y="0"/>
-          <a:ext cx="0" cy="0"/>
-          <a:chOff x="0" y="0"/>
-          <a:chExt cx="0" cy="0"/>
-        </a:xfrm>
-      </p:grpSpPr>
-      <mc:AlternateContent xmlns:mc="http://schemas.openxmlformats.org/markup-compatibility/2006">
-        <mc:Choice xmlns:a14="http://schemas.microsoft.com/office/drawing/2010/main" Requires="a14">
+      <mc:AlternateContent xmlns:mc="http://schemas.openxmlformats.org/markup-compatibility/2006" xmlns:a14="http://schemas.microsoft.com/office/drawing/2010/main">
+        <mc:Choice Requires="a14">
           <p:sp>
             <p:nvSpPr>
               <p:cNvPr id="7" name="Rounded Rectangle 6">
@@ -7708,7 +3896,7 @@
             </p:txBody>
           </p:sp>
         </mc:Choice>
-        <mc:Fallback>
+        <mc:Fallback xmlns="">
           <p:sp>
             <p:nvSpPr>
               <p:cNvPr id="7" name="Rounded Rectangle 6">
@@ -7753,8 +3941,8 @@
           </p:sp>
         </mc:Fallback>
       </mc:AlternateContent>
-      <mc:AlternateContent xmlns:mc="http://schemas.openxmlformats.org/markup-compatibility/2006">
-        <mc:Choice xmlns:a14="http://schemas.microsoft.com/office/drawing/2010/main" Requires="a14">
+      <mc:AlternateContent xmlns:mc="http://schemas.openxmlformats.org/markup-compatibility/2006" xmlns:a14="http://schemas.microsoft.com/office/drawing/2010/main">
+        <mc:Choice Requires="a14">
           <p:sp>
             <p:nvSpPr>
               <p:cNvPr id="8" name="Rounded Rectangle 7">
@@ -7843,7 +4031,7 @@
             </p:txBody>
           </p:sp>
         </mc:Choice>
-        <mc:Fallback>
+        <mc:Fallback xmlns="">
           <p:sp>
             <p:nvSpPr>
               <p:cNvPr id="8" name="Rounded Rectangle 7">
@@ -7904,8 +4092,8 @@
             </p:nvSpPr>
             <p:spPr>
               <a:xfrm>
-                <a:off x="474489" y="358552"/>
-                <a:ext cx="964905" cy="805416"/>
+                <a:off x="472785" y="394064"/>
+                <a:ext cx="1017699" cy="805416"/>
               </a:xfrm>
               <a:prstGeom prst="roundRect">
                 <a:avLst/>
@@ -7990,6 +4178,58 @@
                           </m:r>
                         </m:sup>
                       </m:sSubSup>
+                      <m:r>
+                        <a:rPr lang="en-US" sz="2400" b="0" i="1" smtClean="0">
+                          <a:solidFill>
+                            <a:prstClr val="black"/>
+                          </a:solidFill>
+                          <a:latin typeface="Cambria Math" panose="02040503050406030204" pitchFamily="18" charset="0"/>
+                        </a:rPr>
+                        <m:t>,</m:t>
+                      </m:r>
+                      <m:sSub>
+                        <m:sSubPr>
+                          <m:ctrlPr>
+                            <a:rPr lang="en-US" sz="2400" b="0" i="1" smtClean="0">
+                              <a:solidFill>
+                                <a:prstClr val="black"/>
+                              </a:solidFill>
+                              <a:latin typeface="Cambria Math" panose="02040503050406030204" pitchFamily="18" charset="0"/>
+                            </a:rPr>
+                          </m:ctrlPr>
+                        </m:sSubPr>
+                        <m:e>
+                          <m:r>
+                            <a:rPr lang="en-US" sz="2400" b="0" i="1" smtClean="0">
+                              <a:solidFill>
+                                <a:prstClr val="black"/>
+                              </a:solidFill>
+                              <a:latin typeface="Cambria Math" panose="02040503050406030204" pitchFamily="18" charset="0"/>
+                            </a:rPr>
+                            <m:t>𝑚</m:t>
+                          </m:r>
+                        </m:e>
+                        <m:sub>
+                          <m:r>
+                            <a:rPr lang="en-US" sz="2400" b="0" i="1" smtClean="0">
+                              <a:solidFill>
+                                <a:prstClr val="black"/>
+                              </a:solidFill>
+                              <a:latin typeface="Cambria Math" panose="02040503050406030204" pitchFamily="18" charset="0"/>
+                            </a:rPr>
+                            <m:t>𝑡</m:t>
+                          </m:r>
+                        </m:sub>
+                      </m:sSub>
+                      <m:r>
+                        <a:rPr lang="en-US" sz="2400" b="0" i="1" smtClean="0">
+                          <a:solidFill>
+                            <a:prstClr val="black"/>
+                          </a:solidFill>
+                          <a:latin typeface="Cambria Math" panose="02040503050406030204" pitchFamily="18" charset="0"/>
+                        </a:rPr>
+                        <m:t> </m:t>
+                      </m:r>
                     </m:oMath>
                   </m:oMathPara>
                 </a14:m>
@@ -8019,8 +4259,8 @@
             </p:nvSpPr>
             <p:spPr>
               <a:xfrm>
-                <a:off x="474489" y="358552"/>
-                <a:ext cx="964905" cy="805416"/>
+                <a:off x="472785" y="394064"/>
+                <a:ext cx="1017699" cy="805416"/>
               </a:xfrm>
               <a:prstGeom prst="roundRect">
                 <a:avLst/>
@@ -8028,7 +4268,7 @@
               <a:blipFill>
                 <a:blip r:embed="rId5"/>
                 <a:stretch>
-                  <a:fillRect/>
+                  <a:fillRect r="-15663" b="-3030"/>
                 </a:stretch>
               </a:blipFill>
             </p:spPr>
@@ -8063,7 +4303,7 @@
             </p:nvSpPr>
             <p:spPr>
               <a:xfrm>
-                <a:off x="4921601" y="1623099"/>
+                <a:off x="4593611" y="1623099"/>
                 <a:ext cx="1035927" cy="805416"/>
               </a:xfrm>
               <a:prstGeom prst="roundRect">
@@ -8140,7 +4380,7 @@
             </p:nvSpPr>
             <p:spPr>
               <a:xfrm>
-                <a:off x="4921601" y="1623099"/>
+                <a:off x="4593611" y="1623099"/>
                 <a:ext cx="1035927" cy="805416"/>
               </a:xfrm>
               <a:prstGeom prst="roundRect">
@@ -8168,8 +4408,8 @@
           </p:sp>
         </mc:Fallback>
       </mc:AlternateContent>
-      <mc:AlternateContent xmlns:mc="http://schemas.openxmlformats.org/markup-compatibility/2006">
-        <mc:Choice xmlns:a14="http://schemas.microsoft.com/office/drawing/2010/main" Requires="a14">
+      <mc:AlternateContent xmlns:mc="http://schemas.openxmlformats.org/markup-compatibility/2006" xmlns:a14="http://schemas.microsoft.com/office/drawing/2010/main">
+        <mc:Choice Requires="a14">
           <p:sp>
             <p:nvSpPr>
               <p:cNvPr id="11" name="Rounded Rectangle 10">
@@ -8263,7 +4503,7 @@
             </p:txBody>
           </p:sp>
         </mc:Choice>
-        <mc:Fallback>
+        <mc:Fallback xmlns="">
           <p:sp>
             <p:nvSpPr>
               <p:cNvPr id="11" name="Rounded Rectangle 10">
@@ -8308,8 +4548,8 @@
           </p:sp>
         </mc:Fallback>
       </mc:AlternateContent>
-      <mc:AlternateContent xmlns:mc="http://schemas.openxmlformats.org/markup-compatibility/2006">
-        <mc:Choice xmlns:a14="http://schemas.microsoft.com/office/drawing/2010/main" Requires="a14">
+      <mc:AlternateContent xmlns:mc="http://schemas.openxmlformats.org/markup-compatibility/2006" xmlns:a14="http://schemas.microsoft.com/office/drawing/2010/main">
+        <mc:Choice Requires="a14">
           <p:sp>
             <p:nvSpPr>
               <p:cNvPr id="12" name="Rounded Rectangle 11">
@@ -8401,7 +4641,7 @@
             </p:txBody>
           </p:sp>
         </mc:Choice>
-        <mc:Fallback>
+        <mc:Fallback xmlns="">
           <p:sp>
             <p:nvSpPr>
               <p:cNvPr id="12" name="Rounded Rectangle 11">
@@ -8446,8 +4686,8 @@
           </p:sp>
         </mc:Fallback>
       </mc:AlternateContent>
-      <mc:AlternateContent xmlns:mc="http://schemas.openxmlformats.org/markup-compatibility/2006">
-        <mc:Choice xmlns:a14="http://schemas.microsoft.com/office/drawing/2010/main" Requires="a14">
+      <mc:AlternateContent xmlns:mc="http://schemas.openxmlformats.org/markup-compatibility/2006" xmlns:a14="http://schemas.microsoft.com/office/drawing/2010/main">
+        <mc:Choice Requires="a14">
           <p:sp>
             <p:nvSpPr>
               <p:cNvPr id="13" name="Rounded Rectangle 12">
@@ -8542,7 +4782,7 @@
             </p:txBody>
           </p:sp>
         </mc:Choice>
-        <mc:Fallback>
+        <mc:Fallback xmlns="">
           <p:sp>
             <p:nvSpPr>
               <p:cNvPr id="13" name="Rounded Rectangle 12">
@@ -8587,8 +4827,8 @@
           </p:sp>
         </mc:Fallback>
       </mc:AlternateContent>
-      <mc:AlternateContent xmlns:mc="http://schemas.openxmlformats.org/markup-compatibility/2006">
-        <mc:Choice xmlns:a14="http://schemas.microsoft.com/office/drawing/2010/main" Requires="a14">
+      <mc:AlternateContent xmlns:mc="http://schemas.openxmlformats.org/markup-compatibility/2006" xmlns:a14="http://schemas.microsoft.com/office/drawing/2010/main">
+        <mc:Choice Requires="a14">
           <p:sp>
             <p:nvSpPr>
               <p:cNvPr id="14" name="Rounded Rectangle 13">
@@ -8799,7 +5039,7 @@
             </p:txBody>
           </p:sp>
         </mc:Choice>
-        <mc:Fallback>
+        <mc:Fallback xmlns="">
           <p:sp>
             <p:nvSpPr>
               <p:cNvPr id="14" name="Rounded Rectangle 13">
@@ -8844,8 +5084,8 @@
           </p:sp>
         </mc:Fallback>
       </mc:AlternateContent>
-      <mc:AlternateContent xmlns:mc="http://schemas.openxmlformats.org/markup-compatibility/2006">
-        <mc:Choice xmlns:a14="http://schemas.microsoft.com/office/drawing/2010/main" Requires="a14">
+      <mc:AlternateContent xmlns:mc="http://schemas.openxmlformats.org/markup-compatibility/2006" xmlns:a14="http://schemas.microsoft.com/office/drawing/2010/main">
+        <mc:Choice Requires="a14">
           <p:sp>
             <p:nvSpPr>
               <p:cNvPr id="15" name="Rounded Rectangle 14">
@@ -8986,7 +5226,7 @@
             </p:txBody>
           </p:sp>
         </mc:Choice>
-        <mc:Fallback>
+        <mc:Fallback xmlns="">
           <p:sp>
             <p:nvSpPr>
               <p:cNvPr id="15" name="Rounded Rectangle 14">
@@ -9031,8 +5271,8 @@
           </p:sp>
         </mc:Fallback>
       </mc:AlternateContent>
-      <mc:AlternateContent xmlns:mc="http://schemas.openxmlformats.org/markup-compatibility/2006">
-        <mc:Choice xmlns:a14="http://schemas.microsoft.com/office/drawing/2010/main" Requires="a14">
+      <mc:AlternateContent xmlns:mc="http://schemas.openxmlformats.org/markup-compatibility/2006" xmlns:a14="http://schemas.microsoft.com/office/drawing/2010/main">
+        <mc:Choice Requires="a14">
           <p:sp>
             <p:nvSpPr>
               <p:cNvPr id="16" name="Rounded Rectangle 15">
@@ -9239,7 +5479,7 @@
             </p:txBody>
           </p:sp>
         </mc:Choice>
-        <mc:Fallback>
+        <mc:Fallback xmlns="">
           <p:sp>
             <p:nvSpPr>
               <p:cNvPr id="16" name="Rounded Rectangle 15">
@@ -9345,8 +5585,8 @@
         </p:nvCxnSpPr>
         <p:spPr>
           <a:xfrm rot="5400000">
-            <a:off x="3818680" y="2312382"/>
-            <a:ext cx="575167" cy="812383"/>
+            <a:off x="3659655" y="2471407"/>
+            <a:ext cx="575167" cy="494333"/>
           </a:xfrm>
           <a:prstGeom prst="curvedConnector2">
             <a:avLst/>
@@ -9431,8 +5671,8 @@
         </p:nvCxnSpPr>
         <p:spPr>
           <a:xfrm rot="16200000" flipH="1">
-            <a:off x="826840" y="1294069"/>
-            <a:ext cx="1842189" cy="1581985"/>
+            <a:off x="856943" y="1324172"/>
+            <a:ext cx="1806677" cy="1557292"/>
           </a:xfrm>
           <a:prstGeom prst="curvedConnector2">
             <a:avLst/>
@@ -9474,8 +5714,8 @@
         </p:nvCxnSpPr>
         <p:spPr>
           <a:xfrm>
-            <a:off x="956942" y="1163968"/>
-            <a:ext cx="71056" cy="2532445"/>
+            <a:off x="981635" y="1199480"/>
+            <a:ext cx="46363" cy="2496933"/>
           </a:xfrm>
           <a:prstGeom prst="straightConnector1">
             <a:avLst/>
@@ -9734,8 +5974,8 @@
         </p:nvCxnSpPr>
         <p:spPr>
           <a:xfrm rot="16200000" flipH="1">
-            <a:off x="3884465" y="997585"/>
-            <a:ext cx="426094" cy="829884"/>
+            <a:off x="3725440" y="1156610"/>
+            <a:ext cx="426094" cy="511834"/>
           </a:xfrm>
           <a:prstGeom prst="curvedConnector3">
             <a:avLst>
@@ -9824,8 +6064,8 @@
         </p:nvCxnSpPr>
         <p:spPr>
           <a:xfrm rot="16200000" flipH="1">
-            <a:off x="1187115" y="933795"/>
-            <a:ext cx="394503" cy="854848"/>
+            <a:off x="1217217" y="963897"/>
+            <a:ext cx="358991" cy="830155"/>
           </a:xfrm>
           <a:prstGeom prst="curvedConnector3">
             <a:avLst>
@@ -9867,7 +6107,7 @@
             </p:nvSpPr>
             <p:spPr>
               <a:xfrm>
-                <a:off x="4165021" y="1625574"/>
+                <a:off x="3846971" y="1625574"/>
                 <a:ext cx="694866" cy="805416"/>
               </a:xfrm>
               <a:prstGeom prst="roundRect">
@@ -9967,7 +6207,7 @@
             </p:nvSpPr>
             <p:spPr>
               <a:xfrm>
-                <a:off x="4165021" y="1625574"/>
+                <a:off x="3846971" y="1625574"/>
                 <a:ext cx="694866" cy="805416"/>
               </a:xfrm>
               <a:prstGeom prst="roundRect">
@@ -10013,8 +6253,8 @@
         </p:nvCxnSpPr>
         <p:spPr>
           <a:xfrm rot="5400000">
-            <a:off x="4280997" y="1847589"/>
-            <a:ext cx="577642" cy="1739494"/>
+            <a:off x="4117002" y="2011584"/>
+            <a:ext cx="577642" cy="1411504"/>
           </a:xfrm>
           <a:prstGeom prst="curvedConnector2">
             <a:avLst/>
@@ -10038,8 +6278,8 @@
           </a:fontRef>
         </p:style>
       </p:cxnSp>
-      <mc:AlternateContent xmlns:mc="http://schemas.openxmlformats.org/markup-compatibility/2006">
-        <mc:Choice xmlns:a14="http://schemas.microsoft.com/office/drawing/2010/main" Requires="a14">
+      <mc:AlternateContent xmlns:mc="http://schemas.openxmlformats.org/markup-compatibility/2006" xmlns:a14="http://schemas.microsoft.com/office/drawing/2010/main">
+        <mc:Choice Requires="a14">
           <p:sp>
             <p:nvSpPr>
               <p:cNvPr id="56" name="Rounded Rectangle 55">
@@ -10126,7 +6366,7 @@
             </p:txBody>
           </p:sp>
         </mc:Choice>
-        <mc:Fallback>
+        <mc:Fallback xmlns="">
           <p:sp>
             <p:nvSpPr>
               <p:cNvPr id="56" name="Rounded Rectangle 55">

</xml_diff>